<commit_message>
tout fini, imprimer E2 E3 et relier
</commit_message>
<xml_diff>
--- a/E2/Présentation E2.pptx
+++ b/E2/Présentation E2.pptx
@@ -5,23 +5,24 @@
     <p:sldMasterId id="2147483861" r:id="rId4"/>
   </p:sldMasterIdLst>
   <p:notesMasterIdLst>
-    <p:notesMasterId r:id="rId16"/>
+    <p:notesMasterId r:id="rId17"/>
   </p:notesMasterIdLst>
   <p:handoutMasterIdLst>
-    <p:handoutMasterId r:id="rId17"/>
+    <p:handoutMasterId r:id="rId18"/>
   </p:handoutMasterIdLst>
   <p:sldIdLst>
     <p:sldId id="298" r:id="rId5"/>
-    <p:sldId id="316" r:id="rId6"/>
-    <p:sldId id="314" r:id="rId7"/>
-    <p:sldId id="300" r:id="rId8"/>
-    <p:sldId id="305" r:id="rId9"/>
-    <p:sldId id="309" r:id="rId10"/>
-    <p:sldId id="311" r:id="rId11"/>
-    <p:sldId id="312" r:id="rId12"/>
-    <p:sldId id="315" r:id="rId13"/>
-    <p:sldId id="302" r:id="rId14"/>
-    <p:sldId id="303" r:id="rId15"/>
+    <p:sldId id="317" r:id="rId6"/>
+    <p:sldId id="316" r:id="rId7"/>
+    <p:sldId id="314" r:id="rId8"/>
+    <p:sldId id="300" r:id="rId9"/>
+    <p:sldId id="305" r:id="rId10"/>
+    <p:sldId id="309" r:id="rId11"/>
+    <p:sldId id="311" r:id="rId12"/>
+    <p:sldId id="312" r:id="rId13"/>
+    <p:sldId id="315" r:id="rId14"/>
+    <p:sldId id="302" r:id="rId15"/>
+    <p:sldId id="303" r:id="rId16"/>
   </p:sldIdLst>
   <p:sldSz cx="12192000" cy="6858000"/>
   <p:notesSz cx="6858000" cy="9144000"/>
@@ -213,7 +214,7 @@
           <a:p>
             <a:fld id="{56C2D11A-4A4C-4762-9A3D-38B816BFA086}" type="datetimeFigureOut">
               <a:rPr lang="fr-FR" smtClean="0"/>
-              <a:t>27/05/2024</a:t>
+              <a:t>28/05/2024</a:t>
             </a:fld>
             <a:endParaRPr lang="fr-FR" dirty="0"/>
           </a:p>
@@ -378,7 +379,7 @@
           <a:p>
             <a:fld id="{DD3E8838-E61C-436D-81FA-CFC9A861CF2C}" type="datetimeFigureOut">
               <a:rPr lang="fr-FR" noProof="0" smtClean="0"/>
-              <a:t>27/05/2024</a:t>
+              <a:t>28/05/2024</a:t>
             </a:fld>
             <a:endParaRPr lang="fr-FR" noProof="0" dirty="0"/>
           </a:p>
@@ -732,6 +733,90 @@
 </p:notes>
 </file>
 
+<file path=ppt/notesSlides/notesSlide10.xml><?xml version="1.0" encoding="utf-8"?>
+<p:notes xmlns:a="http://schemas.openxmlformats.org/drawingml/2006/main" xmlns:r="http://schemas.openxmlformats.org/officeDocument/2006/relationships" xmlns:p="http://schemas.openxmlformats.org/presentationml/2006/main">
+  <p:cSld>
+    <p:spTree>
+      <p:nvGrpSpPr>
+        <p:cNvPr id="1" name=""/>
+        <p:cNvGrpSpPr/>
+        <p:nvPr/>
+      </p:nvGrpSpPr>
+      <p:grpSpPr>
+        <a:xfrm>
+          <a:off x="0" y="0"/>
+          <a:ext cx="0" cy="0"/>
+          <a:chOff x="0" y="0"/>
+          <a:chExt cx="0" cy="0"/>
+        </a:xfrm>
+      </p:grpSpPr>
+      <p:sp>
+        <p:nvSpPr>
+          <p:cNvPr id="2" name="Espace réservé de l'image des diapositives 1"/>
+          <p:cNvSpPr>
+            <a:spLocks noGrp="1" noRot="1" noChangeAspect="1"/>
+          </p:cNvSpPr>
+          <p:nvPr>
+            <p:ph type="sldImg"/>
+          </p:nvPr>
+        </p:nvSpPr>
+        <p:spPr/>
+      </p:sp>
+      <p:sp>
+        <p:nvSpPr>
+          <p:cNvPr id="3" name="Espace réservé des notes 2"/>
+          <p:cNvSpPr>
+            <a:spLocks noGrp="1"/>
+          </p:cNvSpPr>
+          <p:nvPr>
+            <p:ph type="body" idx="1"/>
+          </p:nvPr>
+        </p:nvSpPr>
+        <p:spPr/>
+        <p:txBody>
+          <a:bodyPr/>
+          <a:lstStyle/>
+          <a:p>
+            <a:endParaRPr lang="fr-FR" dirty="0"/>
+          </a:p>
+        </p:txBody>
+      </p:sp>
+      <p:sp>
+        <p:nvSpPr>
+          <p:cNvPr id="4" name="Espace réservé du numéro de diapositive 3"/>
+          <p:cNvSpPr>
+            <a:spLocks noGrp="1"/>
+          </p:cNvSpPr>
+          <p:nvPr>
+            <p:ph type="sldNum" sz="quarter" idx="10"/>
+          </p:nvPr>
+        </p:nvSpPr>
+        <p:spPr/>
+        <p:txBody>
+          <a:bodyPr/>
+          <a:lstStyle/>
+          <a:p>
+            <a:fld id="{1DB0C060-F7D4-4C65-826A-795CA5BE88E2}" type="slidenum">
+              <a:rPr lang="fr-FR" smtClean="0"/>
+              <a:t>10</a:t>
+            </a:fld>
+            <a:endParaRPr lang="fr-FR" dirty="0"/>
+          </a:p>
+        </p:txBody>
+      </p:sp>
+    </p:spTree>
+    <p:extLst>
+      <p:ext uri="{BB962C8B-B14F-4D97-AF65-F5344CB8AC3E}">
+        <p14:creationId xmlns:p14="http://schemas.microsoft.com/office/powerpoint/2010/main" val="1754751808"/>
+      </p:ext>
+    </p:extLst>
+  </p:cSld>
+  <p:clrMapOvr>
+    <a:masterClrMapping/>
+  </p:clrMapOvr>
+</p:notes>
+</file>
+
 <file path=ppt/notesSlides/notesSlide2.xml><?xml version="1.0" encoding="utf-8"?>
 <p:notes xmlns:a="http://schemas.openxmlformats.org/drawingml/2006/main" xmlns:r="http://schemas.openxmlformats.org/officeDocument/2006/relationships" xmlns:p="http://schemas.openxmlformats.org/presentationml/2006/main">
   <p:cSld>
@@ -809,7 +894,7 @@
     </p:spTree>
     <p:extLst>
       <p:ext uri="{BB962C8B-B14F-4D97-AF65-F5344CB8AC3E}">
-        <p14:creationId xmlns:p14="http://schemas.microsoft.com/office/powerpoint/2010/main" val="3850942064"/>
+        <p14:creationId xmlns:p14="http://schemas.microsoft.com/office/powerpoint/2010/main" val="2537632304"/>
       </p:ext>
     </p:extLst>
   </p:cSld>
@@ -865,7 +950,7 @@
           <a:p>
             <a:r>
               <a:rPr lang="fr-FR" dirty="0"/>
-              <a:t>L’application retourne une prédiction pour chaque employés, nous vous seulement savoir quel employé à la plus haute prédiction</a:t>
+              <a:t>Nous reprenons le travail d’un ancien employé</a:t>
             </a:r>
           </a:p>
         </p:txBody>
@@ -896,7 +981,7 @@
     </p:spTree>
     <p:extLst>
       <p:ext uri="{BB962C8B-B14F-4D97-AF65-F5344CB8AC3E}">
-        <p14:creationId xmlns:p14="http://schemas.microsoft.com/office/powerpoint/2010/main" val="3984769999"/>
+        <p14:creationId xmlns:p14="http://schemas.microsoft.com/office/powerpoint/2010/main" val="3850942064"/>
       </p:ext>
     </p:extLst>
   </p:cSld>
@@ -952,7 +1037,7 @@
           <a:p>
             <a:r>
               <a:rPr lang="fr-FR" dirty="0"/>
-              <a:t>Cette structure permet de faciliter la séparation des données et de ne pas les mélanger</a:t>
+              <a:t>L’application retourne une prédiction pour chaque employés, nous vous seulement savoir quel employé à la plus haute prédiction</a:t>
             </a:r>
           </a:p>
         </p:txBody>
@@ -983,7 +1068,7 @@
     </p:spTree>
     <p:extLst>
       <p:ext uri="{BB962C8B-B14F-4D97-AF65-F5344CB8AC3E}">
-        <p14:creationId xmlns:p14="http://schemas.microsoft.com/office/powerpoint/2010/main" val="200307616"/>
+        <p14:creationId xmlns:p14="http://schemas.microsoft.com/office/powerpoint/2010/main" val="3984769999"/>
       </p:ext>
     </p:extLst>
   </p:cSld>
@@ -1039,7 +1124,7 @@
           <a:p>
             <a:r>
               <a:rPr lang="fr-FR" dirty="0"/>
-              <a:t>La normalisation des pixels était anciennement dans le notebook, je l’ai implémentée dans le modèle</a:t>
+              <a:t>Cette structure permet de faciliter la séparation des données et de ne pas les mélanger</a:t>
             </a:r>
           </a:p>
         </p:txBody>
@@ -1070,7 +1155,7 @@
     </p:spTree>
     <p:extLst>
       <p:ext uri="{BB962C8B-B14F-4D97-AF65-F5344CB8AC3E}">
-        <p14:creationId xmlns:p14="http://schemas.microsoft.com/office/powerpoint/2010/main" val="2671129752"/>
+        <p14:creationId xmlns:p14="http://schemas.microsoft.com/office/powerpoint/2010/main" val="200307616"/>
       </p:ext>
     </p:extLst>
   </p:cSld>
@@ -1126,14 +1211,7 @@
           <a:p>
             <a:r>
               <a:rPr lang="fr-FR" dirty="0"/>
-              <a:t>Les résultats sont plus robustes avec la data augmentation</a:t>
-            </a:r>
-            <a:br>
-              <a:rPr lang="fr-FR" dirty="0"/>
-            </a:br>
-            <a:r>
-              <a:rPr lang="fr-FR" dirty="0"/>
-              <a:t>Dire le modèle choisi</a:t>
+              <a:t>La normalisation des pixels était anciennement dans le notebook, je l’ai implémentée dans le modèle</a:t>
             </a:r>
           </a:p>
         </p:txBody>
@@ -1164,7 +1242,7 @@
     </p:spTree>
     <p:extLst>
       <p:ext uri="{BB962C8B-B14F-4D97-AF65-F5344CB8AC3E}">
-        <p14:creationId xmlns:p14="http://schemas.microsoft.com/office/powerpoint/2010/main" val="4040694066"/>
+        <p14:creationId xmlns:p14="http://schemas.microsoft.com/office/powerpoint/2010/main" val="2671129752"/>
       </p:ext>
     </p:extLst>
   </p:cSld>
@@ -1218,7 +1296,17 @@
           <a:bodyPr/>
           <a:lstStyle/>
           <a:p>
-            <a:endParaRPr lang="fr-FR" dirty="0"/>
+            <a:r>
+              <a:rPr lang="fr-FR" dirty="0"/>
+              <a:t>Les résultats sont plus robustes avec la data augmentation</a:t>
+            </a:r>
+            <a:br>
+              <a:rPr lang="fr-FR" dirty="0"/>
+            </a:br>
+            <a:r>
+              <a:rPr lang="fr-FR" dirty="0"/>
+              <a:t>Dire le modèle choisi</a:t>
+            </a:r>
           </a:p>
         </p:txBody>
       </p:sp>
@@ -1248,7 +1336,7 @@
     </p:spTree>
     <p:extLst>
       <p:ext uri="{BB962C8B-B14F-4D97-AF65-F5344CB8AC3E}">
-        <p14:creationId xmlns:p14="http://schemas.microsoft.com/office/powerpoint/2010/main" val="2032535545"/>
+        <p14:creationId xmlns:p14="http://schemas.microsoft.com/office/powerpoint/2010/main" val="4040694066"/>
       </p:ext>
     </p:extLst>
   </p:cSld>
@@ -1332,7 +1420,7 @@
     </p:spTree>
     <p:extLst>
       <p:ext uri="{BB962C8B-B14F-4D97-AF65-F5344CB8AC3E}">
-        <p14:creationId xmlns:p14="http://schemas.microsoft.com/office/powerpoint/2010/main" val="344770948"/>
+        <p14:creationId xmlns:p14="http://schemas.microsoft.com/office/powerpoint/2010/main" val="2032535545"/>
       </p:ext>
     </p:extLst>
   </p:cSld>
@@ -1416,7 +1504,7 @@
     </p:spTree>
     <p:extLst>
       <p:ext uri="{BB962C8B-B14F-4D97-AF65-F5344CB8AC3E}">
-        <p14:creationId xmlns:p14="http://schemas.microsoft.com/office/powerpoint/2010/main" val="1754751808"/>
+        <p14:creationId xmlns:p14="http://schemas.microsoft.com/office/powerpoint/2010/main" val="344770948"/>
       </p:ext>
     </p:extLst>
   </p:cSld>
@@ -1574,7 +1662,7 @@
             <a:pPr rtl="0"/>
             <a:fld id="{4A41D6F3-35EA-49AA-AB87-864D9748FB6C}" type="datetime1">
               <a:rPr lang="fr-FR" noProof="0" smtClean="0"/>
-              <a:t>27/05/2024</a:t>
+              <a:t>28/05/2024</a:t>
             </a:fld>
             <a:endParaRPr lang="fr-FR" noProof="0" dirty="0"/>
           </a:p>
@@ -1775,7 +1863,7 @@
             <a:pPr rtl="0"/>
             <a:fld id="{95430EC2-D7EC-4602-979C-D398A8C7E917}" type="datetime1">
               <a:rPr lang="fr-FR" noProof="0" smtClean="0"/>
-              <a:t>27/05/2024</a:t>
+              <a:t>28/05/2024</a:t>
             </a:fld>
             <a:endParaRPr lang="fr-FR" noProof="0" dirty="0"/>
           </a:p>
@@ -1987,7 +2075,7 @@
             <a:pPr rtl="0"/>
             <a:fld id="{95430EC2-D7EC-4602-979C-D398A8C7E917}" type="datetime1">
               <a:rPr lang="fr-FR" noProof="0" smtClean="0"/>
-              <a:t>27/05/2024</a:t>
+              <a:t>28/05/2024</a:t>
             </a:fld>
             <a:endParaRPr lang="fr-FR" noProof="0" dirty="0"/>
           </a:p>
@@ -2189,7 +2277,7 @@
             <a:pPr rtl="0"/>
             <a:fld id="{95430EC2-D7EC-4602-979C-D398A8C7E917}" type="datetime1">
               <a:rPr lang="fr-FR" noProof="0" smtClean="0"/>
-              <a:t>27/05/2024</a:t>
+              <a:t>28/05/2024</a:t>
             </a:fld>
             <a:endParaRPr lang="fr-FR" noProof="0" dirty="0"/>
           </a:p>
@@ -2468,7 +2556,7 @@
             <a:pPr rtl="0"/>
             <a:fld id="{70899AD4-69A8-4016-A569-300C25D8E25B}" type="datetime1">
               <a:rPr lang="fr-FR" noProof="0" smtClean="0"/>
-              <a:t>27/05/2024</a:t>
+              <a:t>28/05/2024</a:t>
             </a:fld>
             <a:endParaRPr lang="fr-FR" noProof="0" dirty="0"/>
           </a:p>
@@ -2736,7 +2824,7 @@
             <a:pPr rtl="0"/>
             <a:fld id="{95430EC2-D7EC-4602-979C-D398A8C7E917}" type="datetime1">
               <a:rPr lang="fr-FR" noProof="0" smtClean="0"/>
-              <a:t>27/05/2024</a:t>
+              <a:t>28/05/2024</a:t>
             </a:fld>
             <a:endParaRPr lang="fr-FR" noProof="0" dirty="0"/>
           </a:p>
@@ -3152,7 +3240,7 @@
             <a:pPr rtl="0"/>
             <a:fld id="{95430EC2-D7EC-4602-979C-D398A8C7E917}" type="datetime1">
               <a:rPr lang="fr-FR" noProof="0" smtClean="0"/>
-              <a:t>27/05/2024</a:t>
+              <a:t>28/05/2024</a:t>
             </a:fld>
             <a:endParaRPr lang="fr-FR" noProof="0" dirty="0"/>
           </a:p>
@@ -3297,7 +3385,7 @@
             <a:pPr rtl="0"/>
             <a:fld id="{8C5B4866-B7CE-4F2A-94B5-88DBB6CC5D99}" type="datetime1">
               <a:rPr lang="fr-FR" noProof="0" smtClean="0"/>
-              <a:t>27/05/2024</a:t>
+              <a:t>28/05/2024</a:t>
             </a:fld>
             <a:endParaRPr lang="fr-FR" noProof="0" dirty="0"/>
           </a:p>
@@ -3413,7 +3501,7 @@
             <a:pPr rtl="0"/>
             <a:fld id="{5128769B-F75B-4B7B-8CB8-1756623D3F68}" type="datetime1">
               <a:rPr lang="fr-FR" noProof="0" smtClean="0"/>
-              <a:t>27/05/2024</a:t>
+              <a:t>28/05/2024</a:t>
             </a:fld>
             <a:endParaRPr lang="fr-FR" noProof="0" dirty="0"/>
           </a:p>
@@ -3727,7 +3815,7 @@
             <a:pPr rtl="0"/>
             <a:fld id="{95430EC2-D7EC-4602-979C-D398A8C7E917}" type="datetime1">
               <a:rPr lang="fr-FR" noProof="0" smtClean="0"/>
-              <a:t>27/05/2024</a:t>
+              <a:t>28/05/2024</a:t>
             </a:fld>
             <a:endParaRPr lang="fr-FR" noProof="0" dirty="0"/>
           </a:p>
@@ -4019,7 +4107,7 @@
             <a:pPr rtl="0"/>
             <a:fld id="{6995260D-60B8-40B6-8999-B8F9CD58307F}" type="datetime1">
               <a:rPr lang="fr-FR" noProof="0" smtClean="0"/>
-              <a:t>27/05/2024</a:t>
+              <a:t>28/05/2024</a:t>
             </a:fld>
             <a:endParaRPr lang="fr-FR" noProof="0" dirty="0"/>
           </a:p>
@@ -4268,7 +4356,7 @@
             <a:pPr rtl="0"/>
             <a:fld id="{95430EC2-D7EC-4602-979C-D398A8C7E917}" type="datetime1">
               <a:rPr lang="fr-FR" noProof="0" smtClean="0"/>
-              <a:t>27/05/2024</a:t>
+              <a:t>28/05/2024</a:t>
             </a:fld>
             <a:endParaRPr lang="fr-FR" noProof="0" dirty="0"/>
           </a:p>
@@ -4846,7 +4934,7 @@
           <p:cNvPr id="2" name="Titre 1">
             <a:extLst>
               <a:ext uri="{FF2B5EF4-FFF2-40B4-BE49-F238E27FC236}">
-                <a16:creationId xmlns:a16="http://schemas.microsoft.com/office/drawing/2014/main" id="{1E755489-D726-44DA-F31D-9E0F87735888}"/>
+                <a16:creationId xmlns:a16="http://schemas.microsoft.com/office/drawing/2014/main" id="{75AC86D3-8FD1-4F47-A319-7D0542E48B2F}"/>
               </a:ext>
             </a:extLst>
           </p:cNvPr>
@@ -4857,37 +4945,24 @@
             <p:ph type="title"/>
           </p:nvPr>
         </p:nvSpPr>
-        <p:spPr/>
-        <p:txBody>
-          <a:bodyPr/>
-          <a:lstStyle/>
-          <a:p>
-            <a:endParaRPr lang="fr-FR" dirty="0"/>
-          </a:p>
-        </p:txBody>
-      </p:sp>
-      <p:sp>
-        <p:nvSpPr>
-          <p:cNvPr id="3" name="Espace réservé du contenu 2">
-            <a:extLst>
-              <a:ext uri="{FF2B5EF4-FFF2-40B4-BE49-F238E27FC236}">
-                <a16:creationId xmlns:a16="http://schemas.microsoft.com/office/drawing/2014/main" id="{D607089D-B495-079F-9D8C-8FAD39BEDCEB}"/>
-              </a:ext>
-            </a:extLst>
-          </p:cNvPr>
-          <p:cNvSpPr>
-            <a:spLocks noGrp="1"/>
-          </p:cNvSpPr>
-          <p:nvPr>
-            <p:ph idx="1"/>
-          </p:nvPr>
-        </p:nvSpPr>
-        <p:spPr/>
-        <p:txBody>
-          <a:bodyPr/>
-          <a:lstStyle/>
-          <a:p>
-            <a:endParaRPr lang="fr-FR"/>
+        <p:spPr>
+          <a:xfrm>
+            <a:off x="225275" y="309270"/>
+            <a:ext cx="8596668" cy="427305"/>
+          </a:xfrm>
+        </p:spPr>
+        <p:txBody>
+          <a:bodyPr vert="horz" lIns="91440" tIns="45720" rIns="91440" bIns="45720" rtlCol="0">
+            <a:noAutofit/>
+          </a:bodyPr>
+          <a:lstStyle/>
+          <a:p>
+            <a:r>
+              <a:rPr lang="fr-FR" sz="2500" u="sng" dirty="0">
+                <a:latin typeface="Calibri corps"/>
+              </a:rPr>
+              <a:t>5. Conclusion</a:t>
+            </a:r>
           </a:p>
         </p:txBody>
       </p:sp>
@@ -4896,7 +4971,7 @@
           <p:cNvPr id="4" name="Espace réservé du numéro de diapositive 3">
             <a:extLst>
               <a:ext uri="{FF2B5EF4-FFF2-40B4-BE49-F238E27FC236}">
-                <a16:creationId xmlns:a16="http://schemas.microsoft.com/office/drawing/2014/main" id="{1C56BDC5-A175-C579-9335-33E34C44467D}"/>
+                <a16:creationId xmlns:a16="http://schemas.microsoft.com/office/drawing/2014/main" id="{90618B9A-7E67-CF71-EB1C-3E957EB79618}"/>
               </a:ext>
             </a:extLst>
           </p:cNvPr>
@@ -4921,10 +4996,74 @@
           </a:p>
         </p:txBody>
       </p:sp>
+      <p:sp>
+        <p:nvSpPr>
+          <p:cNvPr id="6" name="ZoneTexte 5">
+            <a:extLst>
+              <a:ext uri="{FF2B5EF4-FFF2-40B4-BE49-F238E27FC236}">
+                <a16:creationId xmlns:a16="http://schemas.microsoft.com/office/drawing/2014/main" id="{64813D20-4B87-1BE0-5C96-5F8DFBDFBB8A}"/>
+              </a:ext>
+            </a:extLst>
+          </p:cNvPr>
+          <p:cNvSpPr txBox="1"/>
+          <p:nvPr/>
+        </p:nvSpPr>
+        <p:spPr>
+          <a:xfrm>
+            <a:off x="225275" y="1065933"/>
+            <a:ext cx="11354360" cy="2846933"/>
+          </a:xfrm>
+          <a:prstGeom prst="rect">
+            <a:avLst/>
+          </a:prstGeom>
+          <a:noFill/>
+        </p:spPr>
+        <p:txBody>
+          <a:bodyPr wrap="square" rtlCol="0">
+            <a:spAutoFit/>
+          </a:bodyPr>
+          <a:lstStyle/>
+          <a:p>
+            <a:r>
+              <a:rPr lang="fr-FR" sz="2300" dirty="0"/>
+              <a:t>Nous avons amélioré le modèle d’IA, de 0,73 de </a:t>
+            </a:r>
+            <a:r>
+              <a:rPr lang="fr-FR" sz="2300" dirty="0" err="1"/>
+              <a:t>val_accuracy</a:t>
+            </a:r>
+            <a:r>
+              <a:rPr lang="fr-FR" sz="2300" dirty="0"/>
+              <a:t> pour le modèle de départ, à 0,96.</a:t>
+            </a:r>
+          </a:p>
+          <a:p>
+            <a:endParaRPr lang="fr-FR" sz="2300" dirty="0"/>
+          </a:p>
+          <a:p>
+            <a:r>
+              <a:rPr lang="fr-FR" sz="2300" dirty="0"/>
+              <a:t>Ajout d’une data augmentation, ainsi qu’une couche de 300 neurones.</a:t>
+            </a:r>
+          </a:p>
+          <a:p>
+            <a:endParaRPr lang="fr-FR" sz="2300" dirty="0"/>
+          </a:p>
+          <a:p>
+            <a:r>
+              <a:rPr lang="fr-FR" sz="2300" dirty="0"/>
+              <a:t>L’application est également devenue fonctionnelle, en affichant les caractéristiques de l’employé dont l’œil est analysé.</a:t>
+            </a:r>
+          </a:p>
+          <a:p>
+            <a:endParaRPr lang="fr-FR" dirty="0"/>
+          </a:p>
+        </p:txBody>
+      </p:sp>
     </p:spTree>
     <p:extLst>
       <p:ext uri="{BB962C8B-B14F-4D97-AF65-F5344CB8AC3E}">
-        <p14:creationId xmlns:p14="http://schemas.microsoft.com/office/powerpoint/2010/main" val="1009740926"/>
+        <p14:creationId xmlns:p14="http://schemas.microsoft.com/office/powerpoint/2010/main" val="2951193119"/>
       </p:ext>
     </p:extLst>
   </p:cSld>
@@ -4972,41 +5111,41 @@
           <a:bodyPr/>
           <a:lstStyle/>
           <a:p>
+            <a:endParaRPr lang="fr-FR" dirty="0"/>
+          </a:p>
+        </p:txBody>
+      </p:sp>
+      <p:sp>
+        <p:nvSpPr>
+          <p:cNvPr id="3" name="Espace réservé du contenu 2">
+            <a:extLst>
+              <a:ext uri="{FF2B5EF4-FFF2-40B4-BE49-F238E27FC236}">
+                <a16:creationId xmlns:a16="http://schemas.microsoft.com/office/drawing/2014/main" id="{D607089D-B495-079F-9D8C-8FAD39BEDCEB}"/>
+              </a:ext>
+            </a:extLst>
+          </p:cNvPr>
+          <p:cNvSpPr>
+            <a:spLocks noGrp="1"/>
+          </p:cNvSpPr>
+          <p:nvPr>
+            <p:ph idx="1"/>
+          </p:nvPr>
+        </p:nvSpPr>
+        <p:spPr/>
+        <p:txBody>
+          <a:bodyPr/>
+          <a:lstStyle/>
+          <a:p>
             <a:endParaRPr lang="fr-FR"/>
           </a:p>
         </p:txBody>
       </p:sp>
       <p:sp>
         <p:nvSpPr>
-          <p:cNvPr id="3" name="Espace réservé du contenu 2">
-            <a:extLst>
-              <a:ext uri="{FF2B5EF4-FFF2-40B4-BE49-F238E27FC236}">
-                <a16:creationId xmlns:a16="http://schemas.microsoft.com/office/drawing/2014/main" id="{D607089D-B495-079F-9D8C-8FAD39BEDCEB}"/>
-              </a:ext>
-            </a:extLst>
-          </p:cNvPr>
-          <p:cNvSpPr>
-            <a:spLocks noGrp="1"/>
-          </p:cNvSpPr>
-          <p:nvPr>
-            <p:ph idx="1"/>
-          </p:nvPr>
-        </p:nvSpPr>
-        <p:spPr/>
-        <p:txBody>
-          <a:bodyPr/>
-          <a:lstStyle/>
-          <a:p>
-            <a:endParaRPr lang="fr-FR"/>
-          </a:p>
-        </p:txBody>
-      </p:sp>
-      <p:sp>
-        <p:nvSpPr>
           <p:cNvPr id="4" name="Espace réservé du numéro de diapositive 3">
             <a:extLst>
               <a:ext uri="{FF2B5EF4-FFF2-40B4-BE49-F238E27FC236}">
-                <a16:creationId xmlns:a16="http://schemas.microsoft.com/office/drawing/2014/main" id="{165E90AD-2FE0-3855-FEF7-0FB945D924B1}"/>
+                <a16:creationId xmlns:a16="http://schemas.microsoft.com/office/drawing/2014/main" id="{1C56BDC5-A175-C579-9335-33E34C44467D}"/>
               </a:ext>
             </a:extLst>
           </p:cNvPr>
@@ -5026,6 +5165,116 @@
             <a:fld id="{3A98EE3D-8CD1-4C3F-BD1C-C98C9596463C}" type="slidenum">
               <a:rPr lang="fr-FR" noProof="0" smtClean="0"/>
               <a:t>11</a:t>
+            </a:fld>
+            <a:endParaRPr lang="fr-FR" noProof="0" dirty="0"/>
+          </a:p>
+        </p:txBody>
+      </p:sp>
+    </p:spTree>
+    <p:extLst>
+      <p:ext uri="{BB962C8B-B14F-4D97-AF65-F5344CB8AC3E}">
+        <p14:creationId xmlns:p14="http://schemas.microsoft.com/office/powerpoint/2010/main" val="1009740926"/>
+      </p:ext>
+    </p:extLst>
+  </p:cSld>
+  <p:clrMapOvr>
+    <a:masterClrMapping/>
+  </p:clrMapOvr>
+</p:sld>
+</file>
+
+<file path=ppt/slides/slide12.xml><?xml version="1.0" encoding="utf-8"?>
+<p:sld xmlns:a="http://schemas.openxmlformats.org/drawingml/2006/main" xmlns:r="http://schemas.openxmlformats.org/officeDocument/2006/relationships" xmlns:p="http://schemas.openxmlformats.org/presentationml/2006/main">
+  <p:cSld>
+    <p:spTree>
+      <p:nvGrpSpPr>
+        <p:cNvPr id="1" name=""/>
+        <p:cNvGrpSpPr/>
+        <p:nvPr/>
+      </p:nvGrpSpPr>
+      <p:grpSpPr>
+        <a:xfrm>
+          <a:off x="0" y="0"/>
+          <a:ext cx="0" cy="0"/>
+          <a:chOff x="0" y="0"/>
+          <a:chExt cx="0" cy="0"/>
+        </a:xfrm>
+      </p:grpSpPr>
+      <p:sp>
+        <p:nvSpPr>
+          <p:cNvPr id="2" name="Titre 1">
+            <a:extLst>
+              <a:ext uri="{FF2B5EF4-FFF2-40B4-BE49-F238E27FC236}">
+                <a16:creationId xmlns:a16="http://schemas.microsoft.com/office/drawing/2014/main" id="{1E755489-D726-44DA-F31D-9E0F87735888}"/>
+              </a:ext>
+            </a:extLst>
+          </p:cNvPr>
+          <p:cNvSpPr>
+            <a:spLocks noGrp="1"/>
+          </p:cNvSpPr>
+          <p:nvPr>
+            <p:ph type="title"/>
+          </p:nvPr>
+        </p:nvSpPr>
+        <p:spPr/>
+        <p:txBody>
+          <a:bodyPr/>
+          <a:lstStyle/>
+          <a:p>
+            <a:endParaRPr lang="fr-FR"/>
+          </a:p>
+        </p:txBody>
+      </p:sp>
+      <p:sp>
+        <p:nvSpPr>
+          <p:cNvPr id="3" name="Espace réservé du contenu 2">
+            <a:extLst>
+              <a:ext uri="{FF2B5EF4-FFF2-40B4-BE49-F238E27FC236}">
+                <a16:creationId xmlns:a16="http://schemas.microsoft.com/office/drawing/2014/main" id="{D607089D-B495-079F-9D8C-8FAD39BEDCEB}"/>
+              </a:ext>
+            </a:extLst>
+          </p:cNvPr>
+          <p:cNvSpPr>
+            <a:spLocks noGrp="1"/>
+          </p:cNvSpPr>
+          <p:nvPr>
+            <p:ph idx="1"/>
+          </p:nvPr>
+        </p:nvSpPr>
+        <p:spPr/>
+        <p:txBody>
+          <a:bodyPr/>
+          <a:lstStyle/>
+          <a:p>
+            <a:endParaRPr lang="fr-FR"/>
+          </a:p>
+        </p:txBody>
+      </p:sp>
+      <p:sp>
+        <p:nvSpPr>
+          <p:cNvPr id="4" name="Espace réservé du numéro de diapositive 3">
+            <a:extLst>
+              <a:ext uri="{FF2B5EF4-FFF2-40B4-BE49-F238E27FC236}">
+                <a16:creationId xmlns:a16="http://schemas.microsoft.com/office/drawing/2014/main" id="{165E90AD-2FE0-3855-FEF7-0FB945D924B1}"/>
+              </a:ext>
+            </a:extLst>
+          </p:cNvPr>
+          <p:cNvSpPr>
+            <a:spLocks noGrp="1"/>
+          </p:cNvSpPr>
+          <p:nvPr>
+            <p:ph type="sldNum" sz="quarter" idx="12"/>
+          </p:nvPr>
+        </p:nvSpPr>
+        <p:spPr/>
+        <p:txBody>
+          <a:bodyPr/>
+          <a:lstStyle/>
+          <a:p>
+            <a:pPr rtl="0"/>
+            <a:fld id="{3A98EE3D-8CD1-4C3F-BD1C-C98C9596463C}" type="slidenum">
+              <a:rPr lang="fr-FR" noProof="0" smtClean="0"/>
+              <a:t>12</a:t>
             </a:fld>
             <a:endParaRPr lang="fr-FR" noProof="0" dirty="0"/>
           </a:p>
@@ -5063,151 +5312,6 @@
       </p:grpSpPr>
       <p:sp>
         <p:nvSpPr>
-          <p:cNvPr id="7" name="Sous-titre 6">
-            <a:extLst>
-              <a:ext uri="{FF2B5EF4-FFF2-40B4-BE49-F238E27FC236}">
-                <a16:creationId xmlns:a16="http://schemas.microsoft.com/office/drawing/2014/main" id="{A2E56759-8E8B-D5C1-1D07-05F22D37C6E2}"/>
-              </a:ext>
-            </a:extLst>
-          </p:cNvPr>
-          <p:cNvSpPr>
-            <a:spLocks noGrp="1"/>
-          </p:cNvSpPr>
-          <p:nvPr>
-            <p:ph type="subTitle" idx="1"/>
-          </p:nvPr>
-        </p:nvSpPr>
-        <p:spPr>
-          <a:xfrm>
-            <a:off x="163043" y="251643"/>
-            <a:ext cx="11842143" cy="6469831"/>
-          </a:xfrm>
-        </p:spPr>
-        <p:txBody>
-          <a:bodyPr>
-            <a:normAutofit/>
-          </a:bodyPr>
-          <a:lstStyle/>
-          <a:p>
-            <a:pPr algn="l"/>
-            <a:r>
-              <a:rPr lang="fr-FR" sz="2500" u="sng" dirty="0"/>
-              <a:t>Contexte</a:t>
-            </a:r>
-            <a:r>
-              <a:rPr lang="fr-FR" sz="1800" dirty="0"/>
-              <a:t> :</a:t>
-            </a:r>
-          </a:p>
-          <a:p>
-            <a:pPr algn="l"/>
-            <a:endParaRPr lang="fr-FR" sz="1800" dirty="0"/>
-          </a:p>
-          <a:p>
-            <a:pPr algn="l"/>
-            <a:r>
-              <a:rPr lang="fr-FR" sz="2300" dirty="0"/>
-              <a:t>Une entreprise nous missionne pour améliorer une application de reconnaissance d’yeux, qui permet de scanner et d’identifier ses salariés</a:t>
-            </a:r>
-          </a:p>
-          <a:p>
-            <a:pPr algn="l"/>
-            <a:endParaRPr lang="fr-FR" sz="2300" dirty="0"/>
-          </a:p>
-          <a:p>
-            <a:pPr algn="l"/>
-            <a:endParaRPr lang="fr-FR" sz="2300" dirty="0"/>
-          </a:p>
-          <a:p>
-            <a:pPr algn="l"/>
-            <a:r>
-              <a:rPr lang="fr-FR" sz="2300" dirty="0"/>
-              <a:t>Les données sont :</a:t>
-            </a:r>
-          </a:p>
-          <a:p>
-            <a:pPr algn="l"/>
-            <a:r>
-              <a:rPr lang="fr-FR" sz="2300" dirty="0"/>
-              <a:t>	- 5 images de chaque œil des 45 employés de l’entreprise</a:t>
-            </a:r>
-          </a:p>
-          <a:p>
-            <a:pPr algn="l"/>
-            <a:r>
-              <a:rPr lang="fr-FR" sz="2300" dirty="0"/>
-              <a:t>	- Un fichier </a:t>
-            </a:r>
-            <a:r>
-              <a:rPr lang="fr-FR" sz="2300" dirty="0" err="1"/>
-              <a:t>json</a:t>
-            </a:r>
-            <a:r>
-              <a:rPr lang="fr-FR" sz="2300" dirty="0"/>
-              <a:t> regroupant les informations sur les employés</a:t>
-            </a:r>
-          </a:p>
-          <a:p>
-            <a:pPr algn="l"/>
-            <a:endParaRPr lang="fr-FR" sz="2300" dirty="0"/>
-          </a:p>
-          <a:p>
-            <a:pPr algn="l"/>
-            <a:r>
-              <a:rPr lang="fr-FR" sz="2300" dirty="0"/>
-              <a:t>Un ancien employé a réalisé :</a:t>
-            </a:r>
-          </a:p>
-          <a:p>
-            <a:pPr algn="l"/>
-            <a:endParaRPr lang="fr-FR" sz="2300" dirty="0"/>
-          </a:p>
-          <a:p>
-            <a:pPr algn="l"/>
-            <a:r>
-              <a:rPr lang="fr-FR" sz="2300" dirty="0"/>
-              <a:t>	- </a:t>
-            </a:r>
-            <a:r>
-              <a:rPr lang="fr-FR" sz="2300" u="sng" dirty="0"/>
-              <a:t>Un notebook </a:t>
-            </a:r>
-            <a:r>
-              <a:rPr lang="fr-FR" sz="2300" dirty="0"/>
-              <a:t>: modèle VGG16, 0,73 de précision pour le jeu de validation sur l’œil gauche</a:t>
-            </a:r>
-          </a:p>
-          <a:p>
-            <a:pPr algn="l"/>
-            <a:r>
-              <a:rPr lang="fr-FR" sz="2300" dirty="0"/>
-              <a:t>	- </a:t>
-            </a:r>
-            <a:r>
-              <a:rPr lang="fr-FR" sz="2300" u="sng" dirty="0"/>
-              <a:t>Une application </a:t>
-            </a:r>
-            <a:r>
-              <a:rPr lang="fr-FR" sz="2300" u="sng" dirty="0" err="1"/>
-              <a:t>tkinter</a:t>
-            </a:r>
-            <a:r>
-              <a:rPr lang="fr-FR" sz="2300" dirty="0"/>
-              <a:t> non terminée</a:t>
-            </a:r>
-          </a:p>
-          <a:p>
-            <a:pPr lvl="2" algn="l"/>
-            <a:endParaRPr lang="fr-FR" dirty="0"/>
-          </a:p>
-          <a:p>
-            <a:pPr algn="l"/>
-            <a:endParaRPr lang="fr-FR" sz="1800" u="sng" dirty="0"/>
-          </a:p>
-        </p:txBody>
-      </p:sp>
-      <p:sp>
-        <p:nvSpPr>
           <p:cNvPr id="3" name="Espace réservé du numéro de diapositive 2">
             <a:extLst>
               <a:ext uri="{FF2B5EF4-FFF2-40B4-BE49-F238E27FC236}">
@@ -5236,10 +5340,150 @@
           </a:p>
         </p:txBody>
       </p:sp>
+      <p:sp>
+        <p:nvSpPr>
+          <p:cNvPr id="6" name="Titre 1">
+            <a:extLst>
+              <a:ext uri="{FF2B5EF4-FFF2-40B4-BE49-F238E27FC236}">
+                <a16:creationId xmlns:a16="http://schemas.microsoft.com/office/drawing/2014/main" id="{AFB369EA-D965-7341-4131-55A6251ECE76}"/>
+              </a:ext>
+            </a:extLst>
+          </p:cNvPr>
+          <p:cNvSpPr txBox="1">
+            <a:spLocks/>
+          </p:cNvSpPr>
+          <p:nvPr/>
+        </p:nvSpPr>
+        <p:spPr>
+          <a:xfrm>
+            <a:off x="226143" y="486902"/>
+            <a:ext cx="2323305" cy="584814"/>
+          </a:xfrm>
+          <a:prstGeom prst="rect">
+            <a:avLst/>
+          </a:prstGeom>
+        </p:spPr>
+        <p:txBody>
+          <a:bodyPr vert="horz" lIns="91440" tIns="45720" rIns="91440" bIns="45720" rtlCol="0" anchor="b">
+            <a:noAutofit/>
+          </a:bodyPr>
+          <a:lstStyle>
+            <a:lvl1pPr algn="ctr" defTabSz="914400" rtl="0" eaLnBrk="1" latinLnBrk="0" hangingPunct="1">
+              <a:lnSpc>
+                <a:spcPct val="90000"/>
+              </a:lnSpc>
+              <a:spcBef>
+                <a:spcPct val="0"/>
+              </a:spcBef>
+              <a:buNone/>
+              <a:defRPr sz="6000" kern="1200">
+                <a:solidFill>
+                  <a:schemeClr val="tx1"/>
+                </a:solidFill>
+                <a:latin typeface="+mj-lt"/>
+                <a:ea typeface="+mj-ea"/>
+                <a:cs typeface="+mj-cs"/>
+              </a:defRPr>
+            </a:lvl1pPr>
+          </a:lstStyle>
+          <a:p>
+            <a:r>
+              <a:rPr lang="fr-FR" sz="4000" u="sng" dirty="0"/>
+              <a:t>Sommaire</a:t>
+            </a:r>
+            <a:endParaRPr lang="fr-FR" sz="4000" dirty="0"/>
+          </a:p>
+        </p:txBody>
+      </p:sp>
+      <p:sp>
+        <p:nvSpPr>
+          <p:cNvPr id="4" name="Sous-titre 6">
+            <a:extLst>
+              <a:ext uri="{FF2B5EF4-FFF2-40B4-BE49-F238E27FC236}">
+                <a16:creationId xmlns:a16="http://schemas.microsoft.com/office/drawing/2014/main" id="{0AF61D0B-EADC-B750-F5BF-5119E71A21FC}"/>
+              </a:ext>
+            </a:extLst>
+          </p:cNvPr>
+          <p:cNvSpPr>
+            <a:spLocks noGrp="1"/>
+          </p:cNvSpPr>
+          <p:nvPr>
+            <p:ph type="subTitle" idx="1"/>
+          </p:nvPr>
+        </p:nvSpPr>
+        <p:spPr>
+          <a:xfrm>
+            <a:off x="226143" y="1445340"/>
+            <a:ext cx="8384457" cy="4041060"/>
+          </a:xfrm>
+        </p:spPr>
+        <p:txBody>
+          <a:bodyPr>
+            <a:normAutofit/>
+          </a:bodyPr>
+          <a:lstStyle/>
+          <a:p>
+            <a:pPr algn="l"/>
+            <a:r>
+              <a:rPr lang="fr-FR" sz="2300" dirty="0"/>
+              <a:t>1. Introduction</a:t>
+            </a:r>
+          </a:p>
+          <a:p>
+            <a:pPr algn="l"/>
+            <a:r>
+              <a:rPr lang="fr-FR" sz="2300" dirty="0"/>
+              <a:t>2. Gestion des données</a:t>
+            </a:r>
+          </a:p>
+          <a:p>
+            <a:pPr algn="l"/>
+            <a:r>
+              <a:rPr lang="fr-FR" sz="2300" dirty="0"/>
+              <a:t>3. Amélioration du modèle d’IA</a:t>
+            </a:r>
+          </a:p>
+          <a:p>
+            <a:pPr lvl="1" algn="l"/>
+            <a:r>
+              <a:rPr lang="fr-FR" sz="1900" dirty="0"/>
+              <a:t>3.1 Tests</a:t>
+            </a:r>
+          </a:p>
+          <a:p>
+            <a:pPr lvl="1" algn="l"/>
+            <a:r>
+              <a:rPr lang="fr-FR" sz="1900" dirty="0"/>
+              <a:t>3.2 Data augmentation</a:t>
+            </a:r>
+          </a:p>
+          <a:p>
+            <a:pPr lvl="1" algn="l"/>
+            <a:r>
+              <a:rPr lang="fr-FR" sz="1900" dirty="0"/>
+              <a:t>3.3 Résultats</a:t>
+            </a:r>
+          </a:p>
+          <a:p>
+            <a:pPr algn="l"/>
+            <a:r>
+              <a:rPr lang="fr-FR" sz="2300" dirty="0"/>
+              <a:t>4. Présentation de l’application</a:t>
+            </a:r>
+          </a:p>
+          <a:p>
+            <a:pPr algn="l"/>
+            <a:r>
+              <a:rPr lang="fr-FR" sz="2300" dirty="0"/>
+              <a:t>5. Conclusion</a:t>
+            </a:r>
+          </a:p>
+        </p:txBody>
+      </p:sp>
     </p:spTree>
     <p:extLst>
       <p:ext uri="{BB962C8B-B14F-4D97-AF65-F5344CB8AC3E}">
-        <p14:creationId xmlns:p14="http://schemas.microsoft.com/office/powerpoint/2010/main" val="2478851660"/>
+        <p14:creationId xmlns:p14="http://schemas.microsoft.com/office/powerpoint/2010/main" val="1597278643"/>
       </p:ext>
     </p:extLst>
   </p:cSld>
@@ -5268,26 +5512,159 @@
       </p:grpSpPr>
       <p:sp>
         <p:nvSpPr>
-          <p:cNvPr id="3" name="Espace réservé du numéro de diapositive 2">
-            <a:extLst>
-              <a:ext uri="{FF2B5EF4-FFF2-40B4-BE49-F238E27FC236}">
-                <a16:creationId xmlns:a16="http://schemas.microsoft.com/office/drawing/2014/main" id="{E567F74A-1E91-F3B5-A220-6F7721B132C3}"/>
-              </a:ext>
-            </a:extLst>
-          </p:cNvPr>
-          <p:cNvSpPr>
-            <a:spLocks noGrp="1"/>
-          </p:cNvSpPr>
-          <p:nvPr>
-            <p:ph type="sldNum" sz="quarter" idx="12"/>
+          <p:cNvPr id="7" name="Sous-titre 6">
+            <a:extLst>
+              <a:ext uri="{FF2B5EF4-FFF2-40B4-BE49-F238E27FC236}">
+                <a16:creationId xmlns:a16="http://schemas.microsoft.com/office/drawing/2014/main" id="{A2E56759-8E8B-D5C1-1D07-05F22D37C6E2}"/>
+              </a:ext>
+            </a:extLst>
+          </p:cNvPr>
+          <p:cNvSpPr>
+            <a:spLocks noGrp="1"/>
+          </p:cNvSpPr>
+          <p:nvPr>
+            <p:ph type="subTitle" idx="1"/>
           </p:nvPr>
         </p:nvSpPr>
         <p:spPr>
           <a:xfrm>
-            <a:off x="11621730" y="6426181"/>
-            <a:ext cx="381000" cy="365125"/>
+            <a:off x="163043" y="251643"/>
+            <a:ext cx="11842143" cy="6469831"/>
           </a:xfrm>
         </p:spPr>
+        <p:txBody>
+          <a:bodyPr>
+            <a:normAutofit/>
+          </a:bodyPr>
+          <a:lstStyle/>
+          <a:p>
+            <a:pPr algn="l"/>
+            <a:r>
+              <a:rPr lang="fr-FR" sz="2500" u="sng" dirty="0"/>
+              <a:t>1. Introduction</a:t>
+            </a:r>
+            <a:endParaRPr lang="fr-FR" sz="1800" dirty="0"/>
+          </a:p>
+          <a:p>
+            <a:pPr algn="l"/>
+            <a:endParaRPr lang="fr-FR" sz="1800" dirty="0"/>
+          </a:p>
+          <a:p>
+            <a:pPr algn="l"/>
+            <a:r>
+              <a:rPr lang="fr-FR" sz="2300" dirty="0"/>
+              <a:t>Une entreprise nous missionne pour améliorer une application de reconnaissance d’yeux, qui permet de scanner et d’identifier ses salariés</a:t>
+            </a:r>
+          </a:p>
+          <a:p>
+            <a:pPr algn="l"/>
+            <a:endParaRPr lang="fr-FR" sz="2300" dirty="0"/>
+          </a:p>
+          <a:p>
+            <a:pPr algn="l"/>
+            <a:r>
+              <a:rPr lang="fr-FR" sz="2300" dirty="0"/>
+              <a:t>Les données sont :</a:t>
+            </a:r>
+          </a:p>
+          <a:p>
+            <a:pPr algn="l"/>
+            <a:r>
+              <a:rPr lang="fr-FR" sz="2300" dirty="0"/>
+              <a:t>	- 5 images de chaque œil des 45 employés de l’entreprise</a:t>
+            </a:r>
+          </a:p>
+          <a:p>
+            <a:pPr algn="l"/>
+            <a:r>
+              <a:rPr lang="fr-FR" sz="2300" dirty="0"/>
+              <a:t>	- Un fichier </a:t>
+            </a:r>
+            <a:r>
+              <a:rPr lang="fr-FR" sz="2300" dirty="0" err="1"/>
+              <a:t>json</a:t>
+            </a:r>
+            <a:r>
+              <a:rPr lang="fr-FR" sz="2300" dirty="0"/>
+              <a:t> regroupant les informations sur les employés</a:t>
+            </a:r>
+          </a:p>
+          <a:p>
+            <a:pPr algn="l"/>
+            <a:endParaRPr lang="fr-FR" sz="2300" dirty="0"/>
+          </a:p>
+          <a:p>
+            <a:pPr algn="l"/>
+            <a:r>
+              <a:rPr lang="fr-FR" sz="2300" dirty="0"/>
+              <a:t>Un ancien employé a réalisé :</a:t>
+            </a:r>
+          </a:p>
+          <a:p>
+            <a:pPr algn="l"/>
+            <a:endParaRPr lang="fr-FR" sz="2300" dirty="0"/>
+          </a:p>
+          <a:p>
+            <a:pPr algn="l"/>
+            <a:r>
+              <a:rPr lang="fr-FR" sz="2300" dirty="0"/>
+              <a:t>	- </a:t>
+            </a:r>
+            <a:r>
+              <a:rPr lang="fr-FR" sz="2300" u="sng" dirty="0"/>
+              <a:t>Un notebook </a:t>
+            </a:r>
+            <a:r>
+              <a:rPr lang="fr-FR" sz="2300" dirty="0"/>
+              <a:t>: modèle VGG16, 0,73 de précision pour le jeu de validation sur l’œil gauche</a:t>
+            </a:r>
+          </a:p>
+          <a:p>
+            <a:pPr algn="l"/>
+            <a:r>
+              <a:rPr lang="fr-FR" sz="2300" dirty="0"/>
+              <a:t>	- </a:t>
+            </a:r>
+            <a:r>
+              <a:rPr lang="fr-FR" sz="2300" u="sng" dirty="0"/>
+              <a:t>Une application </a:t>
+            </a:r>
+            <a:r>
+              <a:rPr lang="fr-FR" sz="2300" u="sng" dirty="0" err="1"/>
+              <a:t>tkinter</a:t>
+            </a:r>
+            <a:r>
+              <a:rPr lang="fr-FR" sz="2300" dirty="0"/>
+              <a:t> non terminée</a:t>
+            </a:r>
+          </a:p>
+          <a:p>
+            <a:pPr lvl="2" algn="l"/>
+            <a:endParaRPr lang="fr-FR" dirty="0"/>
+          </a:p>
+          <a:p>
+            <a:pPr algn="l"/>
+            <a:endParaRPr lang="fr-FR" sz="1800" u="sng" dirty="0"/>
+          </a:p>
+        </p:txBody>
+      </p:sp>
+      <p:sp>
+        <p:nvSpPr>
+          <p:cNvPr id="3" name="Espace réservé du numéro de diapositive 2">
+            <a:extLst>
+              <a:ext uri="{FF2B5EF4-FFF2-40B4-BE49-F238E27FC236}">
+                <a16:creationId xmlns:a16="http://schemas.microsoft.com/office/drawing/2014/main" id="{E567F74A-1E91-F3B5-A220-6F7721B132C3}"/>
+              </a:ext>
+            </a:extLst>
+          </p:cNvPr>
+          <p:cNvSpPr>
+            <a:spLocks noGrp="1"/>
+          </p:cNvSpPr>
+          <p:nvPr>
+            <p:ph type="sldNum" sz="quarter" idx="12"/>
+          </p:nvPr>
+        </p:nvSpPr>
+        <p:spPr/>
         <p:txBody>
           <a:bodyPr/>
           <a:lstStyle/>
@@ -5301,183 +5678,10 @@
           </a:p>
         </p:txBody>
       </p:sp>
-      <p:pic>
-        <p:nvPicPr>
-          <p:cNvPr id="5" name="Image 4">
-            <a:extLst>
-              <a:ext uri="{FF2B5EF4-FFF2-40B4-BE49-F238E27FC236}">
-                <a16:creationId xmlns:a16="http://schemas.microsoft.com/office/drawing/2014/main" id="{DA4C8542-E0BC-864D-A515-E8290881EF55}"/>
-              </a:ext>
-            </a:extLst>
-          </p:cNvPr>
-          <p:cNvPicPr>
-            <a:picLocks noChangeAspect="1"/>
-          </p:cNvPicPr>
-          <p:nvPr/>
-        </p:nvPicPr>
-        <p:blipFill>
-          <a:blip r:embed="rId3"/>
-          <a:stretch>
-            <a:fillRect/>
-          </a:stretch>
-        </p:blipFill>
-        <p:spPr>
-          <a:xfrm>
-            <a:off x="1177069" y="136525"/>
-            <a:ext cx="4660914" cy="4549775"/>
-          </a:xfrm>
-          <a:prstGeom prst="rect">
-            <a:avLst/>
-          </a:prstGeom>
-        </p:spPr>
-      </p:pic>
-      <p:sp>
-        <p:nvSpPr>
-          <p:cNvPr id="10" name="ZoneTexte 9">
-            <a:extLst>
-              <a:ext uri="{FF2B5EF4-FFF2-40B4-BE49-F238E27FC236}">
-                <a16:creationId xmlns:a16="http://schemas.microsoft.com/office/drawing/2014/main" id="{12D897FA-FF34-05B5-0F7F-D20FF5267A3C}"/>
-              </a:ext>
-            </a:extLst>
-          </p:cNvPr>
-          <p:cNvSpPr txBox="1"/>
-          <p:nvPr/>
-        </p:nvSpPr>
-        <p:spPr>
-          <a:xfrm>
-            <a:off x="6094440" y="1381760"/>
-            <a:ext cx="5259360" cy="292388"/>
-          </a:xfrm>
-          <a:prstGeom prst="rect">
-            <a:avLst/>
-          </a:prstGeom>
-          <a:noFill/>
-        </p:spPr>
-        <p:txBody>
-          <a:bodyPr wrap="square" rtlCol="0">
-            <a:spAutoFit/>
-          </a:bodyPr>
-          <a:lstStyle/>
-          <a:p>
-            <a:r>
-              <a:rPr lang="fr-FR" sz="1300" i="1" dirty="0">
-                <a:solidFill>
-                  <a:srgbClr val="44546A"/>
-                </a:solidFill>
-                <a:effectLst/>
-                <a:latin typeface="Calibri" panose="020F0502020204030204" pitchFamily="34" charset="0"/>
-                <a:ea typeface="Calibri" panose="020F0502020204030204" pitchFamily="34" charset="0"/>
-                <a:cs typeface="Times New Roman" panose="02020603050405020304" pitchFamily="18" charset="0"/>
-              </a:rPr>
-              <a:t>Figure 1 </a:t>
-            </a:r>
-            <a:r>
-              <a:rPr lang="fr-FR" sz="1300" i="1" dirty="0">
-                <a:solidFill>
-                  <a:srgbClr val="44546A"/>
-                </a:solidFill>
-                <a:latin typeface="Calibri" panose="020F0502020204030204" pitchFamily="34" charset="0"/>
-                <a:ea typeface="Calibri" panose="020F0502020204030204" pitchFamily="34" charset="0"/>
-                <a:cs typeface="Times New Roman" panose="02020603050405020304" pitchFamily="18" charset="0"/>
-              </a:rPr>
-              <a:t>: Application de </a:t>
-            </a:r>
-            <a:r>
-              <a:rPr lang="fr-FR" sz="1300" i="1" dirty="0" err="1">
-                <a:solidFill>
-                  <a:srgbClr val="44546A"/>
-                </a:solidFill>
-                <a:latin typeface="Calibri" panose="020F0502020204030204" pitchFamily="34" charset="0"/>
-                <a:ea typeface="Calibri" panose="020F0502020204030204" pitchFamily="34" charset="0"/>
-                <a:cs typeface="Times New Roman" panose="02020603050405020304" pitchFamily="18" charset="0"/>
-              </a:rPr>
-              <a:t>tkinter</a:t>
-            </a:r>
-            <a:r>
-              <a:rPr lang="fr-FR" sz="1300" i="1" dirty="0">
-                <a:solidFill>
-                  <a:srgbClr val="44546A"/>
-                </a:solidFill>
-                <a:latin typeface="Calibri" panose="020F0502020204030204" pitchFamily="34" charset="0"/>
-                <a:ea typeface="Calibri" panose="020F0502020204030204" pitchFamily="34" charset="0"/>
-                <a:cs typeface="Times New Roman" panose="02020603050405020304" pitchFamily="18" charset="0"/>
-              </a:rPr>
-              <a:t> de l’ancien employé</a:t>
-            </a:r>
-          </a:p>
-        </p:txBody>
-      </p:sp>
-      <p:sp>
-        <p:nvSpPr>
-          <p:cNvPr id="2" name="ZoneTexte 1">
-            <a:extLst>
-              <a:ext uri="{FF2B5EF4-FFF2-40B4-BE49-F238E27FC236}">
-                <a16:creationId xmlns:a16="http://schemas.microsoft.com/office/drawing/2014/main" id="{0418589B-F1E1-D018-18ED-0956720D2679}"/>
-              </a:ext>
-            </a:extLst>
-          </p:cNvPr>
-          <p:cNvSpPr txBox="1"/>
-          <p:nvPr/>
-        </p:nvSpPr>
-        <p:spPr>
-          <a:xfrm>
-            <a:off x="285135" y="4945627"/>
-            <a:ext cx="11798710" cy="2000548"/>
-          </a:xfrm>
-          <a:prstGeom prst="rect">
-            <a:avLst/>
-          </a:prstGeom>
-          <a:noFill/>
-        </p:spPr>
-        <p:txBody>
-          <a:bodyPr wrap="square" rtlCol="0">
-            <a:spAutoFit/>
-          </a:bodyPr>
-          <a:lstStyle/>
-          <a:p>
-            <a:pPr algn="l"/>
-            <a:r>
-              <a:rPr lang="fr-FR" sz="2500" u="sng" dirty="0"/>
-              <a:t>Objectifs</a:t>
-            </a:r>
-            <a:r>
-              <a:rPr lang="fr-FR" sz="2500" dirty="0"/>
-              <a:t> :</a:t>
-            </a:r>
-          </a:p>
-          <a:p>
-            <a:pPr algn="l"/>
-            <a:endParaRPr lang="fr-FR" sz="1200" dirty="0"/>
-          </a:p>
-          <a:p>
-            <a:pPr marL="285750" indent="-285750" algn="l">
-              <a:buFontTx/>
-              <a:buChar char="-"/>
-            </a:pPr>
-            <a:r>
-              <a:rPr lang="fr-FR" sz="2300" dirty="0"/>
-              <a:t>Améliorer les modèles d’IA : différenciation œil gauche/droite, modèle œil gauche, modèle œil droit </a:t>
-            </a:r>
-          </a:p>
-          <a:p>
-            <a:pPr marL="285750" indent="-285750" algn="l">
-              <a:buFontTx/>
-              <a:buChar char="-"/>
-            </a:pPr>
-            <a:r>
-              <a:rPr lang="fr-FR" sz="2300" dirty="0"/>
-              <a:t>Développer une application ergonomique, afficher l’employé ainsi que ses caractéristiques</a:t>
-            </a:r>
-          </a:p>
-          <a:p>
-            <a:endParaRPr lang="fr-FR" dirty="0"/>
-          </a:p>
-        </p:txBody>
-      </p:sp>
     </p:spTree>
     <p:extLst>
       <p:ext uri="{BB962C8B-B14F-4D97-AF65-F5344CB8AC3E}">
-        <p14:creationId xmlns:p14="http://schemas.microsoft.com/office/powerpoint/2010/main" val="3289628311"/>
+        <p14:creationId xmlns:p14="http://schemas.microsoft.com/office/powerpoint/2010/main" val="2478851660"/>
       </p:ext>
     </p:extLst>
   </p:cSld>
@@ -5506,56 +5710,26 @@
       </p:grpSpPr>
       <p:sp>
         <p:nvSpPr>
-          <p:cNvPr id="2" name="Titre 1">
-            <a:extLst>
-              <a:ext uri="{FF2B5EF4-FFF2-40B4-BE49-F238E27FC236}">
-                <a16:creationId xmlns:a16="http://schemas.microsoft.com/office/drawing/2014/main" id="{75AC86D3-8FD1-4F47-A319-7D0542E48B2F}"/>
-              </a:ext>
-            </a:extLst>
-          </p:cNvPr>
-          <p:cNvSpPr>
-            <a:spLocks noGrp="1"/>
-          </p:cNvSpPr>
-          <p:nvPr>
-            <p:ph type="title"/>
+          <p:cNvPr id="3" name="Espace réservé du numéro de diapositive 2">
+            <a:extLst>
+              <a:ext uri="{FF2B5EF4-FFF2-40B4-BE49-F238E27FC236}">
+                <a16:creationId xmlns:a16="http://schemas.microsoft.com/office/drawing/2014/main" id="{E567F74A-1E91-F3B5-A220-6F7721B132C3}"/>
+              </a:ext>
+            </a:extLst>
+          </p:cNvPr>
+          <p:cNvSpPr>
+            <a:spLocks noGrp="1"/>
+          </p:cNvSpPr>
+          <p:nvPr>
+            <p:ph type="sldNum" sz="quarter" idx="12"/>
           </p:nvPr>
         </p:nvSpPr>
         <p:spPr>
           <a:xfrm>
-            <a:off x="365607" y="387928"/>
-            <a:ext cx="8596668" cy="427305"/>
+            <a:off x="11621730" y="6426181"/>
+            <a:ext cx="381000" cy="365125"/>
           </a:xfrm>
         </p:spPr>
-        <p:txBody>
-          <a:bodyPr vert="horz" lIns="91440" tIns="45720" rIns="91440" bIns="45720" rtlCol="0">
-            <a:noAutofit/>
-          </a:bodyPr>
-          <a:lstStyle/>
-          <a:p>
-            <a:r>
-              <a:rPr lang="fr-FR" sz="2500" u="sng" dirty="0"/>
-              <a:t>Gestion des données</a:t>
-            </a:r>
-          </a:p>
-        </p:txBody>
-      </p:sp>
-      <p:sp>
-        <p:nvSpPr>
-          <p:cNvPr id="3" name="Espace réservé du numéro de diapositive 2">
-            <a:extLst>
-              <a:ext uri="{FF2B5EF4-FFF2-40B4-BE49-F238E27FC236}">
-                <a16:creationId xmlns:a16="http://schemas.microsoft.com/office/drawing/2014/main" id="{E04137E6-6D73-B77B-8F7E-CC5140820E67}"/>
-              </a:ext>
-            </a:extLst>
-          </p:cNvPr>
-          <p:cNvSpPr>
-            <a:spLocks noGrp="1"/>
-          </p:cNvSpPr>
-          <p:nvPr>
-            <p:ph type="sldNum" sz="quarter" idx="12"/>
-          </p:nvPr>
-        </p:nvSpPr>
-        <p:spPr/>
         <p:txBody>
           <a:bodyPr/>
           <a:lstStyle/>
@@ -5569,47 +5743,12 @@
           </a:p>
         </p:txBody>
       </p:sp>
-      <p:sp>
-        <p:nvSpPr>
-          <p:cNvPr id="12" name="ZoneTexte 11">
-            <a:extLst>
-              <a:ext uri="{FF2B5EF4-FFF2-40B4-BE49-F238E27FC236}">
-                <a16:creationId xmlns:a16="http://schemas.microsoft.com/office/drawing/2014/main" id="{DF121705-9893-1ECC-2ACA-DFD170725A0D}"/>
-              </a:ext>
-            </a:extLst>
-          </p:cNvPr>
-          <p:cNvSpPr txBox="1"/>
-          <p:nvPr/>
-        </p:nvSpPr>
-        <p:spPr>
-          <a:xfrm>
-            <a:off x="290946" y="6100740"/>
-            <a:ext cx="11901054" cy="446276"/>
-          </a:xfrm>
-          <a:prstGeom prst="rect">
-            <a:avLst/>
-          </a:prstGeom>
-          <a:noFill/>
-        </p:spPr>
-        <p:txBody>
-          <a:bodyPr wrap="square" rtlCol="0">
-            <a:spAutoFit/>
-          </a:bodyPr>
-          <a:lstStyle/>
-          <a:p>
-            <a:r>
-              <a:rPr lang="fr-FR" sz="2300" dirty="0"/>
-              <a:t>Fonction qui importe les bonnes images et les bons labels selon le modèle à entrainer. </a:t>
-            </a:r>
-          </a:p>
-        </p:txBody>
-      </p:sp>
       <p:pic>
         <p:nvPicPr>
           <p:cNvPr id="5" name="Image 4">
             <a:extLst>
               <a:ext uri="{FF2B5EF4-FFF2-40B4-BE49-F238E27FC236}">
-                <a16:creationId xmlns:a16="http://schemas.microsoft.com/office/drawing/2014/main" id="{5D917192-2141-5E2B-672D-EB3F9A269426}"/>
+                <a16:creationId xmlns:a16="http://schemas.microsoft.com/office/drawing/2014/main" id="{DA4C8542-E0BC-864D-A515-E8290881EF55}"/>
               </a:ext>
             </a:extLst>
           </p:cNvPr>
@@ -5626,8 +5765,8 @@
         </p:blipFill>
         <p:spPr>
           <a:xfrm>
-            <a:off x="1775911" y="1959620"/>
-            <a:ext cx="8389318" cy="2686902"/>
+            <a:off x="1177069" y="136525"/>
+            <a:ext cx="4660914" cy="4549775"/>
           </a:xfrm>
           <a:prstGeom prst="rect">
             <a:avLst/>
@@ -5636,10 +5775,10 @@
       </p:pic>
       <p:sp>
         <p:nvSpPr>
-          <p:cNvPr id="7" name="ZoneTexte 6">
-            <a:extLst>
-              <a:ext uri="{FF2B5EF4-FFF2-40B4-BE49-F238E27FC236}">
-                <a16:creationId xmlns:a16="http://schemas.microsoft.com/office/drawing/2014/main" id="{1F1190B3-D7B4-199F-3D11-10E36393425A}"/>
+          <p:cNvPr id="10" name="ZoneTexte 9">
+            <a:extLst>
+              <a:ext uri="{FF2B5EF4-FFF2-40B4-BE49-F238E27FC236}">
+                <a16:creationId xmlns:a16="http://schemas.microsoft.com/office/drawing/2014/main" id="{12D897FA-FF34-05B5-0F7F-D20FF5267A3C}"/>
               </a:ext>
             </a:extLst>
           </p:cNvPr>
@@ -5648,7 +5787,7 @@
         </p:nvSpPr>
         <p:spPr>
           <a:xfrm>
-            <a:off x="1775911" y="4764495"/>
+            <a:off x="6094440" y="1381760"/>
             <a:ext cx="5259360" cy="292388"/>
           </a:xfrm>
           <a:prstGeom prst="rect">
@@ -5672,7 +5811,7 @@
                 <a:ea typeface="Calibri" panose="020F0502020204030204" pitchFamily="34" charset="0"/>
                 <a:cs typeface="Times New Roman" panose="02020603050405020304" pitchFamily="18" charset="0"/>
               </a:rPr>
-              <a:t>Figure 2 </a:t>
+              <a:t>Figure 1 </a:t>
             </a:r>
             <a:r>
               <a:rPr lang="fr-FR" sz="1300" i="1" dirty="0">
@@ -5683,49 +5822,96 @@
                 <a:ea typeface="Calibri" panose="020F0502020204030204" pitchFamily="34" charset="0"/>
                 <a:cs typeface="Times New Roman" panose="02020603050405020304" pitchFamily="18" charset="0"/>
               </a:rPr>
-              <a:t>: Architecture des données</a:t>
-            </a:r>
-          </a:p>
-        </p:txBody>
-      </p:sp>
-      <p:sp>
-        <p:nvSpPr>
-          <p:cNvPr id="6" name="Espace réservé du contenu 5">
-            <a:extLst>
-              <a:ext uri="{FF2B5EF4-FFF2-40B4-BE49-F238E27FC236}">
-                <a16:creationId xmlns:a16="http://schemas.microsoft.com/office/drawing/2014/main" id="{947BE95A-DFA7-6B73-7A5F-1E4FA3608B65}"/>
-              </a:ext>
-            </a:extLst>
-          </p:cNvPr>
-          <p:cNvSpPr>
-            <a:spLocks noGrp="1"/>
-          </p:cNvSpPr>
-          <p:nvPr>
-            <p:ph idx="1"/>
-          </p:nvPr>
+              <a:t>: Application de </a:t>
+            </a:r>
+            <a:r>
+              <a:rPr lang="fr-FR" sz="1300" i="1" dirty="0" err="1">
+                <a:solidFill>
+                  <a:srgbClr val="44546A"/>
+                </a:solidFill>
+                <a:latin typeface="Calibri" panose="020F0502020204030204" pitchFamily="34" charset="0"/>
+                <a:ea typeface="Calibri" panose="020F0502020204030204" pitchFamily="34" charset="0"/>
+                <a:cs typeface="Times New Roman" panose="02020603050405020304" pitchFamily="18" charset="0"/>
+              </a:rPr>
+              <a:t>tkinter</a:t>
+            </a:r>
+            <a:r>
+              <a:rPr lang="fr-FR" sz="1300" i="1" dirty="0">
+                <a:solidFill>
+                  <a:srgbClr val="44546A"/>
+                </a:solidFill>
+                <a:latin typeface="Calibri" panose="020F0502020204030204" pitchFamily="34" charset="0"/>
+                <a:ea typeface="Calibri" panose="020F0502020204030204" pitchFamily="34" charset="0"/>
+                <a:cs typeface="Times New Roman" panose="02020603050405020304" pitchFamily="18" charset="0"/>
+              </a:rPr>
+              <a:t> de l’ancien employé</a:t>
+            </a:r>
+          </a:p>
+        </p:txBody>
+      </p:sp>
+      <p:sp>
+        <p:nvSpPr>
+          <p:cNvPr id="2" name="ZoneTexte 1">
+            <a:extLst>
+              <a:ext uri="{FF2B5EF4-FFF2-40B4-BE49-F238E27FC236}">
+                <a16:creationId xmlns:a16="http://schemas.microsoft.com/office/drawing/2014/main" id="{0418589B-F1E1-D018-18ED-0956720D2679}"/>
+              </a:ext>
+            </a:extLst>
+          </p:cNvPr>
+          <p:cNvSpPr txBox="1"/>
+          <p:nvPr/>
         </p:nvSpPr>
         <p:spPr>
           <a:xfrm>
-            <a:off x="365607" y="1012870"/>
-            <a:ext cx="9875609" cy="427305"/>
+            <a:off x="285135" y="4945627"/>
+            <a:ext cx="11798710" cy="2000548"/>
           </a:xfrm>
+          <a:prstGeom prst="rect">
+            <a:avLst/>
+          </a:prstGeom>
+          <a:noFill/>
         </p:spPr>
         <p:txBody>
-          <a:bodyPr/>
-          <a:lstStyle/>
-          <a:p>
-            <a:pPr marL="0" indent="0">
-              <a:buNone/>
+          <a:bodyPr wrap="square" rtlCol="0">
+            <a:spAutoFit/>
+          </a:bodyPr>
+          <a:lstStyle/>
+          <a:p>
+            <a:pPr algn="l"/>
+            <a:r>
+              <a:rPr lang="fr-FR" sz="2300" u="sng" dirty="0"/>
+              <a:t>Objectifs</a:t>
+            </a:r>
+            <a:r>
+              <a:rPr lang="fr-FR" sz="2500" dirty="0"/>
+              <a:t> :</a:t>
+            </a:r>
+          </a:p>
+          <a:p>
+            <a:pPr algn="l"/>
+            <a:endParaRPr lang="fr-FR" sz="1200" dirty="0"/>
+          </a:p>
+          <a:p>
+            <a:pPr marL="285750" indent="-285750" algn="l">
+              <a:buFontTx/>
+              <a:buChar char="-"/>
             </a:pPr>
             <a:r>
               <a:rPr lang="fr-FR" sz="2300" dirty="0"/>
-              <a:t>Recréation d’un dossier data avec un dossier train, val et test en sous-dossiers :</a:t>
-            </a:r>
-          </a:p>
-          <a:p>
-            <a:pPr marL="0" indent="0">
-              <a:buNone/>
+              <a:t>Améliorer les modèles d’IA : différenciation œil gauche/droite, modèle œil gauche, modèle œil droit </a:t>
+            </a:r>
+          </a:p>
+          <a:p>
+            <a:pPr marL="285750" indent="-285750" algn="l">
+              <a:buFontTx/>
+              <a:buChar char="-"/>
             </a:pPr>
+            <a:r>
+              <a:rPr lang="fr-FR" sz="2300" dirty="0"/>
+              <a:t>Développer une application ergonomique, afficher l’employé ainsi que ses caractéristiques</a:t>
+            </a:r>
+          </a:p>
+          <a:p>
             <a:endParaRPr lang="fr-FR" dirty="0"/>
           </a:p>
         </p:txBody>
@@ -5733,7 +5919,7 @@
     </p:spTree>
     <p:extLst>
       <p:ext uri="{BB962C8B-B14F-4D97-AF65-F5344CB8AC3E}">
-        <p14:creationId xmlns:p14="http://schemas.microsoft.com/office/powerpoint/2010/main" val="2933514334"/>
+        <p14:creationId xmlns:p14="http://schemas.microsoft.com/office/powerpoint/2010/main" val="3289628311"/>
       </p:ext>
     </p:extLst>
   </p:cSld>
@@ -5789,18 +5975,20 @@
           <a:lstStyle/>
           <a:p>
             <a:r>
-              <a:rPr lang="fr-FR" sz="2500" u="sng" dirty="0"/>
-              <a:t>Tests</a:t>
-            </a:r>
-          </a:p>
-        </p:txBody>
-      </p:sp>
-      <p:sp>
-        <p:nvSpPr>
-          <p:cNvPr id="6" name="Espace réservé du numéro de diapositive 5">
-            <a:extLst>
-              <a:ext uri="{FF2B5EF4-FFF2-40B4-BE49-F238E27FC236}">
-                <a16:creationId xmlns:a16="http://schemas.microsoft.com/office/drawing/2014/main" id="{0C6393A4-E9B5-702D-8C32-43C009E30BAD}"/>
+              <a:rPr lang="fr-FR" sz="2500" u="sng" dirty="0">
+                <a:latin typeface="Calibri corps"/>
+              </a:rPr>
+              <a:t>2. Gestion des données</a:t>
+            </a:r>
+          </a:p>
+        </p:txBody>
+      </p:sp>
+      <p:sp>
+        <p:nvSpPr>
+          <p:cNvPr id="3" name="Espace réservé du numéro de diapositive 2">
+            <a:extLst>
+              <a:ext uri="{FF2B5EF4-FFF2-40B4-BE49-F238E27FC236}">
+                <a16:creationId xmlns:a16="http://schemas.microsoft.com/office/drawing/2014/main" id="{E04137E6-6D73-B77B-8F7E-CC5140820E67}"/>
               </a:ext>
             </a:extLst>
           </p:cNvPr>
@@ -5825,12 +6013,47 @@
           </a:p>
         </p:txBody>
       </p:sp>
+      <p:sp>
+        <p:nvSpPr>
+          <p:cNvPr id="12" name="ZoneTexte 11">
+            <a:extLst>
+              <a:ext uri="{FF2B5EF4-FFF2-40B4-BE49-F238E27FC236}">
+                <a16:creationId xmlns:a16="http://schemas.microsoft.com/office/drawing/2014/main" id="{DF121705-9893-1ECC-2ACA-DFD170725A0D}"/>
+              </a:ext>
+            </a:extLst>
+          </p:cNvPr>
+          <p:cNvSpPr txBox="1"/>
+          <p:nvPr/>
+        </p:nvSpPr>
+        <p:spPr>
+          <a:xfrm>
+            <a:off x="365607" y="5731408"/>
+            <a:ext cx="11901054" cy="446276"/>
+          </a:xfrm>
+          <a:prstGeom prst="rect">
+            <a:avLst/>
+          </a:prstGeom>
+          <a:noFill/>
+        </p:spPr>
+        <p:txBody>
+          <a:bodyPr wrap="square" rtlCol="0">
+            <a:spAutoFit/>
+          </a:bodyPr>
+          <a:lstStyle/>
+          <a:p>
+            <a:r>
+              <a:rPr lang="fr-FR" sz="2300" dirty="0"/>
+              <a:t>Fonction qui importe les bonnes images et les bons labels selon le modèle à entrainer. </a:t>
+            </a:r>
+          </a:p>
+        </p:txBody>
+      </p:sp>
       <p:pic>
         <p:nvPicPr>
           <p:cNvPr id="5" name="Image 4">
             <a:extLst>
               <a:ext uri="{FF2B5EF4-FFF2-40B4-BE49-F238E27FC236}">
-                <a16:creationId xmlns:a16="http://schemas.microsoft.com/office/drawing/2014/main" id="{9FCB4DBF-6847-6725-512B-564CDB0F95B1}"/>
+                <a16:creationId xmlns:a16="http://schemas.microsoft.com/office/drawing/2014/main" id="{5D917192-2141-5E2B-672D-EB3F9A269426}"/>
               </a:ext>
             </a:extLst>
           </p:cNvPr>
@@ -5847,8 +6070,8 @@
         </p:blipFill>
         <p:spPr>
           <a:xfrm>
-            <a:off x="1378541" y="2897698"/>
-            <a:ext cx="9726206" cy="1666378"/>
+            <a:off x="1775911" y="1959620"/>
+            <a:ext cx="8389318" cy="2686902"/>
           </a:xfrm>
           <a:prstGeom prst="rect">
             <a:avLst/>
@@ -5857,10 +6080,10 @@
       </p:pic>
       <p:sp>
         <p:nvSpPr>
-          <p:cNvPr id="3" name="ZoneTexte 2">
-            <a:extLst>
-              <a:ext uri="{FF2B5EF4-FFF2-40B4-BE49-F238E27FC236}">
-                <a16:creationId xmlns:a16="http://schemas.microsoft.com/office/drawing/2014/main" id="{E4371EFA-E747-50C5-7BA5-7D0F1F0835D6}"/>
+          <p:cNvPr id="7" name="ZoneTexte 6">
+            <a:extLst>
+              <a:ext uri="{FF2B5EF4-FFF2-40B4-BE49-F238E27FC236}">
+                <a16:creationId xmlns:a16="http://schemas.microsoft.com/office/drawing/2014/main" id="{1F1190B3-D7B4-199F-3D11-10E36393425A}"/>
               </a:ext>
             </a:extLst>
           </p:cNvPr>
@@ -5869,7 +6092,233 @@
         </p:nvSpPr>
         <p:spPr>
           <a:xfrm>
-            <a:off x="313765" y="1075765"/>
+            <a:off x="1775911" y="4764495"/>
+            <a:ext cx="5259360" cy="292388"/>
+          </a:xfrm>
+          <a:prstGeom prst="rect">
+            <a:avLst/>
+          </a:prstGeom>
+          <a:noFill/>
+        </p:spPr>
+        <p:txBody>
+          <a:bodyPr wrap="square" rtlCol="0">
+            <a:spAutoFit/>
+          </a:bodyPr>
+          <a:lstStyle/>
+          <a:p>
+            <a:r>
+              <a:rPr lang="fr-FR" sz="1300" i="1" dirty="0">
+                <a:solidFill>
+                  <a:srgbClr val="44546A"/>
+                </a:solidFill>
+                <a:effectLst/>
+                <a:latin typeface="Calibri" panose="020F0502020204030204" pitchFamily="34" charset="0"/>
+                <a:ea typeface="Calibri" panose="020F0502020204030204" pitchFamily="34" charset="0"/>
+                <a:cs typeface="Times New Roman" panose="02020603050405020304" pitchFamily="18" charset="0"/>
+              </a:rPr>
+              <a:t>Figure 2 </a:t>
+            </a:r>
+            <a:r>
+              <a:rPr lang="fr-FR" sz="1300" i="1" dirty="0">
+                <a:solidFill>
+                  <a:srgbClr val="44546A"/>
+                </a:solidFill>
+                <a:latin typeface="Calibri" panose="020F0502020204030204" pitchFamily="34" charset="0"/>
+                <a:ea typeface="Calibri" panose="020F0502020204030204" pitchFamily="34" charset="0"/>
+                <a:cs typeface="Times New Roman" panose="02020603050405020304" pitchFamily="18" charset="0"/>
+              </a:rPr>
+              <a:t>: Architecture des données</a:t>
+            </a:r>
+          </a:p>
+        </p:txBody>
+      </p:sp>
+      <p:sp>
+        <p:nvSpPr>
+          <p:cNvPr id="6" name="Espace réservé du contenu 5">
+            <a:extLst>
+              <a:ext uri="{FF2B5EF4-FFF2-40B4-BE49-F238E27FC236}">
+                <a16:creationId xmlns:a16="http://schemas.microsoft.com/office/drawing/2014/main" id="{947BE95A-DFA7-6B73-7A5F-1E4FA3608B65}"/>
+              </a:ext>
+            </a:extLst>
+          </p:cNvPr>
+          <p:cNvSpPr>
+            <a:spLocks noGrp="1"/>
+          </p:cNvSpPr>
+          <p:nvPr>
+            <p:ph idx="1"/>
+          </p:nvPr>
+        </p:nvSpPr>
+        <p:spPr>
+          <a:xfrm>
+            <a:off x="365607" y="1012870"/>
+            <a:ext cx="9875609" cy="427305"/>
+          </a:xfrm>
+        </p:spPr>
+        <p:txBody>
+          <a:bodyPr/>
+          <a:lstStyle/>
+          <a:p>
+            <a:pPr marL="0" indent="0">
+              <a:buNone/>
+            </a:pPr>
+            <a:r>
+              <a:rPr lang="fr-FR" sz="2300" dirty="0"/>
+              <a:t>Recréation d’un dossier data avec un dossier train, val et test en sous-dossiers :</a:t>
+            </a:r>
+          </a:p>
+          <a:p>
+            <a:pPr marL="0" indent="0">
+              <a:buNone/>
+            </a:pPr>
+            <a:endParaRPr lang="fr-FR" dirty="0"/>
+          </a:p>
+        </p:txBody>
+      </p:sp>
+    </p:spTree>
+    <p:extLst>
+      <p:ext uri="{BB962C8B-B14F-4D97-AF65-F5344CB8AC3E}">
+        <p14:creationId xmlns:p14="http://schemas.microsoft.com/office/powerpoint/2010/main" val="2933514334"/>
+      </p:ext>
+    </p:extLst>
+  </p:cSld>
+  <p:clrMapOvr>
+    <a:masterClrMapping/>
+  </p:clrMapOvr>
+</p:sld>
+</file>
+
+<file path=ppt/slides/slide6.xml><?xml version="1.0" encoding="utf-8"?>
+<p:sld xmlns:a="http://schemas.openxmlformats.org/drawingml/2006/main" xmlns:r="http://schemas.openxmlformats.org/officeDocument/2006/relationships" xmlns:p="http://schemas.openxmlformats.org/presentationml/2006/main">
+  <p:cSld>
+    <p:spTree>
+      <p:nvGrpSpPr>
+        <p:cNvPr id="1" name=""/>
+        <p:cNvGrpSpPr/>
+        <p:nvPr/>
+      </p:nvGrpSpPr>
+      <p:grpSpPr>
+        <a:xfrm>
+          <a:off x="0" y="0"/>
+          <a:ext cx="0" cy="0"/>
+          <a:chOff x="0" y="0"/>
+          <a:chExt cx="0" cy="0"/>
+        </a:xfrm>
+      </p:grpSpPr>
+      <p:sp>
+        <p:nvSpPr>
+          <p:cNvPr id="2" name="Titre 1">
+            <a:extLst>
+              <a:ext uri="{FF2B5EF4-FFF2-40B4-BE49-F238E27FC236}">
+                <a16:creationId xmlns:a16="http://schemas.microsoft.com/office/drawing/2014/main" id="{75AC86D3-8FD1-4F47-A319-7D0542E48B2F}"/>
+              </a:ext>
+            </a:extLst>
+          </p:cNvPr>
+          <p:cNvSpPr>
+            <a:spLocks noGrp="1"/>
+          </p:cNvSpPr>
+          <p:nvPr>
+            <p:ph type="title"/>
+          </p:nvPr>
+        </p:nvSpPr>
+        <p:spPr>
+          <a:xfrm>
+            <a:off x="128207" y="114976"/>
+            <a:ext cx="8596668" cy="647987"/>
+          </a:xfrm>
+        </p:spPr>
+        <p:txBody>
+          <a:bodyPr vert="horz" lIns="91440" tIns="45720" rIns="91440" bIns="45720" rtlCol="0">
+            <a:noAutofit/>
+          </a:bodyPr>
+          <a:lstStyle/>
+          <a:p>
+            <a:r>
+              <a:rPr lang="fr-FR" sz="2500" u="sng" dirty="0">
+                <a:latin typeface="Calibri corps"/>
+              </a:rPr>
+              <a:t>3. Améliorations du modèle d’IA</a:t>
+            </a:r>
+            <a:endParaRPr lang="fr-FR" sz="2300" u="sng" dirty="0">
+              <a:latin typeface="Calibri corps"/>
+            </a:endParaRPr>
+          </a:p>
+        </p:txBody>
+      </p:sp>
+      <p:sp>
+        <p:nvSpPr>
+          <p:cNvPr id="6" name="Espace réservé du numéro de diapositive 5">
+            <a:extLst>
+              <a:ext uri="{FF2B5EF4-FFF2-40B4-BE49-F238E27FC236}">
+                <a16:creationId xmlns:a16="http://schemas.microsoft.com/office/drawing/2014/main" id="{0C6393A4-E9B5-702D-8C32-43C009E30BAD}"/>
+              </a:ext>
+            </a:extLst>
+          </p:cNvPr>
+          <p:cNvSpPr>
+            <a:spLocks noGrp="1"/>
+          </p:cNvSpPr>
+          <p:nvPr>
+            <p:ph type="sldNum" sz="quarter" idx="12"/>
+          </p:nvPr>
+        </p:nvSpPr>
+        <p:spPr/>
+        <p:txBody>
+          <a:bodyPr/>
+          <a:lstStyle/>
+          <a:p>
+            <a:pPr rtl="0"/>
+            <a:fld id="{3A98EE3D-8CD1-4C3F-BD1C-C98C9596463C}" type="slidenum">
+              <a:rPr lang="fr-FR" noProof="0" smtClean="0"/>
+              <a:t>6</a:t>
+            </a:fld>
+            <a:endParaRPr lang="fr-FR" noProof="0" dirty="0"/>
+          </a:p>
+        </p:txBody>
+      </p:sp>
+      <p:pic>
+        <p:nvPicPr>
+          <p:cNvPr id="5" name="Image 4">
+            <a:extLst>
+              <a:ext uri="{FF2B5EF4-FFF2-40B4-BE49-F238E27FC236}">
+                <a16:creationId xmlns:a16="http://schemas.microsoft.com/office/drawing/2014/main" id="{9FCB4DBF-6847-6725-512B-564CDB0F95B1}"/>
+              </a:ext>
+            </a:extLst>
+          </p:cNvPr>
+          <p:cNvPicPr>
+            <a:picLocks noChangeAspect="1"/>
+          </p:cNvPicPr>
+          <p:nvPr/>
+        </p:nvPicPr>
+        <p:blipFill>
+          <a:blip r:embed="rId3"/>
+          <a:stretch>
+            <a:fillRect/>
+          </a:stretch>
+        </p:blipFill>
+        <p:spPr>
+          <a:xfrm>
+            <a:off x="808270" y="2897698"/>
+            <a:ext cx="11092387" cy="1900444"/>
+          </a:xfrm>
+          <a:prstGeom prst="rect">
+            <a:avLst/>
+          </a:prstGeom>
+        </p:spPr>
+      </p:pic>
+      <p:sp>
+        <p:nvSpPr>
+          <p:cNvPr id="3" name="ZoneTexte 2">
+            <a:extLst>
+              <a:ext uri="{FF2B5EF4-FFF2-40B4-BE49-F238E27FC236}">
+                <a16:creationId xmlns:a16="http://schemas.microsoft.com/office/drawing/2014/main" id="{E4371EFA-E747-50C5-7BA5-7D0F1F0835D6}"/>
+              </a:ext>
+            </a:extLst>
+          </p:cNvPr>
+          <p:cNvSpPr txBox="1"/>
+          <p:nvPr/>
+        </p:nvSpPr>
+        <p:spPr>
+          <a:xfrm>
+            <a:off x="365607" y="1411916"/>
             <a:ext cx="8910917" cy="800219"/>
           </a:xfrm>
           <a:prstGeom prst="rect">
@@ -5910,7 +6359,7 @@
         </p:nvSpPr>
         <p:spPr>
           <a:xfrm>
-            <a:off x="1378541" y="4665947"/>
+            <a:off x="808270" y="5010076"/>
             <a:ext cx="6096000" cy="292388"/>
           </a:xfrm>
           <a:prstGeom prst="rect">
@@ -5964,8 +6413,8 @@
         </p:nvSpPr>
         <p:spPr>
           <a:xfrm>
-            <a:off x="8274512" y="2861089"/>
-            <a:ext cx="1375525" cy="1739596"/>
+            <a:off x="8610600" y="2900544"/>
+            <a:ext cx="1624781" cy="1897597"/>
           </a:xfrm>
           <a:prstGeom prst="rect">
             <a:avLst/>
@@ -6060,669 +6509,66 @@
           </a:p>
         </p:txBody>
       </p:sp>
-    </p:spTree>
-    <p:extLst>
-      <p:ext uri="{BB962C8B-B14F-4D97-AF65-F5344CB8AC3E}">
-        <p14:creationId xmlns:p14="http://schemas.microsoft.com/office/powerpoint/2010/main" val="517833090"/>
-      </p:ext>
-    </p:extLst>
-  </p:cSld>
-  <p:clrMapOvr>
-    <a:masterClrMapping/>
-  </p:clrMapOvr>
-</p:sld>
-</file>
-
-<file path=ppt/slides/slide6.xml><?xml version="1.0" encoding="utf-8"?>
-<p:sld xmlns:a="http://schemas.openxmlformats.org/drawingml/2006/main" xmlns:r="http://schemas.openxmlformats.org/officeDocument/2006/relationships" xmlns:p="http://schemas.openxmlformats.org/presentationml/2006/main">
-  <p:cSld>
-    <p:spTree>
-      <p:nvGrpSpPr>
-        <p:cNvPr id="1" name=""/>
-        <p:cNvGrpSpPr/>
-        <p:nvPr/>
-      </p:nvGrpSpPr>
-      <p:grpSpPr>
-        <a:xfrm>
-          <a:off x="0" y="0"/>
-          <a:ext cx="0" cy="0"/>
-          <a:chOff x="0" y="0"/>
-          <a:chExt cx="0" cy="0"/>
-        </a:xfrm>
-      </p:grpSpPr>
-      <p:pic>
-        <p:nvPicPr>
-          <p:cNvPr id="6" name="Image 5" descr="Une image contenant texte, capture d’écran, Police, ligne">
-            <a:extLst>
-              <a:ext uri="{FF2B5EF4-FFF2-40B4-BE49-F238E27FC236}">
-                <a16:creationId xmlns:a16="http://schemas.microsoft.com/office/drawing/2014/main" id="{E501223C-1869-FADA-DBB2-CF930FCB442C}"/>
-              </a:ext>
-            </a:extLst>
-          </p:cNvPr>
-          <p:cNvPicPr>
-            <a:picLocks noChangeAspect="1"/>
-          </p:cNvPicPr>
+      <p:sp>
+        <p:nvSpPr>
+          <p:cNvPr id="9" name="Titre 1">
+            <a:extLst>
+              <a:ext uri="{FF2B5EF4-FFF2-40B4-BE49-F238E27FC236}">
+                <a16:creationId xmlns:a16="http://schemas.microsoft.com/office/drawing/2014/main" id="{8959ACA8-477B-CE04-B004-F7EDD7DC3DDA}"/>
+              </a:ext>
+            </a:extLst>
+          </p:cNvPr>
+          <p:cNvSpPr txBox="1">
+            <a:spLocks/>
+          </p:cNvSpPr>
           <p:nvPr/>
-        </p:nvPicPr>
-        <p:blipFill>
-          <a:blip r:embed="rId3"/>
-          <a:stretch>
-            <a:fillRect/>
-          </a:stretch>
-        </p:blipFill>
+        </p:nvSpPr>
         <p:spPr>
           <a:xfrm>
-            <a:off x="5211417" y="668412"/>
-            <a:ext cx="6708469" cy="1015946"/>
+            <a:off x="365607" y="570802"/>
+            <a:ext cx="5910437" cy="647987"/>
           </a:xfrm>
           <a:prstGeom prst="rect">
             <a:avLst/>
           </a:prstGeom>
         </p:spPr>
-      </p:pic>
-      <p:pic>
-        <p:nvPicPr>
-          <p:cNvPr id="7" name="Image 6" descr="Une image contenant texte, capture d’écran, Police&#10;&#10;Description générée automatiquement">
-            <a:extLst>
-              <a:ext uri="{FF2B5EF4-FFF2-40B4-BE49-F238E27FC236}">
-                <a16:creationId xmlns:a16="http://schemas.microsoft.com/office/drawing/2014/main" id="{F01DA147-F83E-CEC0-D964-ABAD539769B0}"/>
-              </a:ext>
-            </a:extLst>
-          </p:cNvPr>
-          <p:cNvPicPr>
-            <a:picLocks noChangeAspect="1"/>
-          </p:cNvPicPr>
-          <p:nvPr/>
-        </p:nvPicPr>
-        <p:blipFill>
-          <a:blip r:embed="rId4">
-            <a:extLst>
-              <a:ext uri="{28A0092B-C50C-407E-A947-70E740481C1C}">
-                <a14:useLocalDpi xmlns:a14="http://schemas.microsoft.com/office/drawing/2010/main" val="0"/>
-              </a:ext>
-            </a:extLst>
-          </a:blip>
-          <a:stretch>
-            <a:fillRect/>
-          </a:stretch>
-        </p:blipFill>
-        <p:spPr>
-          <a:xfrm>
-            <a:off x="7478702" y="2341316"/>
-            <a:ext cx="4463700" cy="1816926"/>
-          </a:xfrm>
-          <a:prstGeom prst="rect">
-            <a:avLst/>
-          </a:prstGeom>
-        </p:spPr>
-      </p:pic>
-      <p:pic>
-        <p:nvPicPr>
-          <p:cNvPr id="11" name="Image 10" descr="Une image contenant texte, capture d’écran, Police&#10;&#10;Description générée automatiquement">
-            <a:extLst>
-              <a:ext uri="{FF2B5EF4-FFF2-40B4-BE49-F238E27FC236}">
-                <a16:creationId xmlns:a16="http://schemas.microsoft.com/office/drawing/2014/main" id="{D05FBF8C-9494-D6AF-C257-13C1D6C207B1}"/>
-              </a:ext>
-            </a:extLst>
-          </p:cNvPr>
-          <p:cNvPicPr>
-            <a:picLocks noChangeAspect="1"/>
-          </p:cNvPicPr>
-          <p:nvPr/>
-        </p:nvPicPr>
-        <p:blipFill>
-          <a:blip r:embed="rId5"/>
-          <a:stretch>
-            <a:fillRect/>
-          </a:stretch>
-        </p:blipFill>
-        <p:spPr>
-          <a:xfrm>
-            <a:off x="7441420" y="5006811"/>
-            <a:ext cx="4408803" cy="1094882"/>
-          </a:xfrm>
-          <a:prstGeom prst="rect">
-            <a:avLst/>
-          </a:prstGeom>
-        </p:spPr>
-      </p:pic>
-      <p:sp>
-        <p:nvSpPr>
-          <p:cNvPr id="2" name="Titre 1">
-            <a:extLst>
-              <a:ext uri="{FF2B5EF4-FFF2-40B4-BE49-F238E27FC236}">
-                <a16:creationId xmlns:a16="http://schemas.microsoft.com/office/drawing/2014/main" id="{CC5DBA0F-9F44-C581-3B33-2DD90FB7EB1F}"/>
-              </a:ext>
-            </a:extLst>
-          </p:cNvPr>
-          <p:cNvSpPr>
-            <a:spLocks noGrp="1"/>
-          </p:cNvSpPr>
-          <p:nvPr>
-            <p:ph type="title"/>
-          </p:nvPr>
-        </p:nvSpPr>
-        <p:spPr>
-          <a:xfrm>
-            <a:off x="106922" y="263864"/>
-            <a:ext cx="2669908" cy="427305"/>
-          </a:xfrm>
-        </p:spPr>
-        <p:txBody>
-          <a:bodyPr vert="horz" lIns="91440" tIns="45720" rIns="91440" bIns="45720" rtlCol="0">
+        <p:txBody>
+          <a:bodyPr vert="horz" lIns="91440" tIns="45720" rIns="91440" bIns="45720" rtlCol="0" anchor="ctr">
             <a:noAutofit/>
           </a:bodyPr>
-          <a:lstStyle/>
-          <a:p>
-            <a:r>
-              <a:rPr lang="fr-FR" sz="2500" u="sng" dirty="0"/>
-              <a:t>Data augmentation</a:t>
-            </a:r>
-          </a:p>
-        </p:txBody>
-      </p:sp>
-      <p:sp>
-        <p:nvSpPr>
-          <p:cNvPr id="13" name="Espace réservé du numéro de diapositive 12">
-            <a:extLst>
-              <a:ext uri="{FF2B5EF4-FFF2-40B4-BE49-F238E27FC236}">
-                <a16:creationId xmlns:a16="http://schemas.microsoft.com/office/drawing/2014/main" id="{409AE5C9-4E3E-5687-7C24-E3FA837B2E14}"/>
-              </a:ext>
-            </a:extLst>
-          </p:cNvPr>
-          <p:cNvSpPr>
-            <a:spLocks noGrp="1"/>
-          </p:cNvSpPr>
-          <p:nvPr>
-            <p:ph type="sldNum" sz="quarter" idx="12"/>
-          </p:nvPr>
-        </p:nvSpPr>
-        <p:spPr/>
-        <p:txBody>
-          <a:bodyPr/>
-          <a:lstStyle/>
-          <a:p>
-            <a:pPr rtl="0"/>
-            <a:fld id="{3A98EE3D-8CD1-4C3F-BD1C-C98C9596463C}" type="slidenum">
-              <a:rPr lang="fr-FR" noProof="0" smtClean="0"/>
-              <a:t>6</a:t>
-            </a:fld>
-            <a:endParaRPr lang="fr-FR" noProof="0" dirty="0"/>
-          </a:p>
-        </p:txBody>
-      </p:sp>
-      <p:pic>
-        <p:nvPicPr>
-          <p:cNvPr id="15" name="Image 14">
-            <a:extLst>
-              <a:ext uri="{FF2B5EF4-FFF2-40B4-BE49-F238E27FC236}">
-                <a16:creationId xmlns:a16="http://schemas.microsoft.com/office/drawing/2014/main" id="{957E62C9-0DA6-72FD-D680-D2DA5675C17D}"/>
-              </a:ext>
-            </a:extLst>
-          </p:cNvPr>
-          <p:cNvPicPr>
-            <a:picLocks noChangeAspect="1"/>
-          </p:cNvPicPr>
-          <p:nvPr/>
-        </p:nvPicPr>
-        <p:blipFill>
-          <a:blip r:embed="rId6"/>
-          <a:stretch>
-            <a:fillRect/>
-          </a:stretch>
-        </p:blipFill>
-        <p:spPr>
-          <a:xfrm>
-            <a:off x="249598" y="2808015"/>
-            <a:ext cx="6452648" cy="1703188"/>
-          </a:xfrm>
-          <a:prstGeom prst="rect">
-            <a:avLst/>
-          </a:prstGeom>
-        </p:spPr>
-      </p:pic>
-      <p:pic>
-        <p:nvPicPr>
-          <p:cNvPr id="21" name="Image 20">
-            <a:extLst>
-              <a:ext uri="{FF2B5EF4-FFF2-40B4-BE49-F238E27FC236}">
-                <a16:creationId xmlns:a16="http://schemas.microsoft.com/office/drawing/2014/main" id="{14741205-BCE9-CE84-7A8A-9677DF8396DA}"/>
-              </a:ext>
-            </a:extLst>
-          </p:cNvPr>
-          <p:cNvPicPr>
-            <a:picLocks noChangeAspect="1"/>
-          </p:cNvPicPr>
-          <p:nvPr/>
-        </p:nvPicPr>
-        <p:blipFill>
-          <a:blip r:embed="rId7"/>
-          <a:stretch>
-            <a:fillRect/>
-          </a:stretch>
-        </p:blipFill>
-        <p:spPr>
-          <a:xfrm>
-            <a:off x="253259" y="5314796"/>
-            <a:ext cx="6925799" cy="722377"/>
-          </a:xfrm>
-          <a:prstGeom prst="rect">
-            <a:avLst/>
-          </a:prstGeom>
-        </p:spPr>
-      </p:pic>
-      <p:pic>
-        <p:nvPicPr>
-          <p:cNvPr id="22" name="Image 21" descr="Une image contenant yeux, gros plan, cil, organe&#10;&#10;Description générée automatiquement">
-            <a:extLst>
-              <a:ext uri="{FF2B5EF4-FFF2-40B4-BE49-F238E27FC236}">
-                <a16:creationId xmlns:a16="http://schemas.microsoft.com/office/drawing/2014/main" id="{B06CFEB8-10D3-257A-1D8C-CDFD6EAB8B9A}"/>
-              </a:ext>
-            </a:extLst>
-          </p:cNvPr>
-          <p:cNvPicPr>
-            <a:picLocks noChangeAspect="1"/>
-          </p:cNvPicPr>
-          <p:nvPr/>
-        </p:nvPicPr>
-        <p:blipFill>
-          <a:blip r:embed="rId8"/>
-          <a:stretch>
-            <a:fillRect/>
-          </a:stretch>
-        </p:blipFill>
-        <p:spPr>
-          <a:xfrm>
-            <a:off x="3012804" y="390525"/>
-            <a:ext cx="2069047" cy="1551785"/>
-          </a:xfrm>
-          <a:prstGeom prst="rect">
-            <a:avLst/>
-          </a:prstGeom>
-        </p:spPr>
-      </p:pic>
-      <p:sp>
-        <p:nvSpPr>
-          <p:cNvPr id="25" name="ZoneTexte 24">
-            <a:extLst>
-              <a:ext uri="{FF2B5EF4-FFF2-40B4-BE49-F238E27FC236}">
-                <a16:creationId xmlns:a16="http://schemas.microsoft.com/office/drawing/2014/main" id="{969CC43B-7A0F-C83B-CC75-CCB999281D08}"/>
-              </a:ext>
-            </a:extLst>
-          </p:cNvPr>
-          <p:cNvSpPr txBox="1"/>
-          <p:nvPr/>
-        </p:nvSpPr>
-        <p:spPr>
-          <a:xfrm>
-            <a:off x="3012804" y="2017880"/>
-            <a:ext cx="6096000" cy="292388"/>
-          </a:xfrm>
-          <a:prstGeom prst="rect">
-            <a:avLst/>
-          </a:prstGeom>
-          <a:noFill/>
-        </p:spPr>
-        <p:txBody>
-          <a:bodyPr wrap="square">
-            <a:spAutoFit/>
-          </a:bodyPr>
-          <a:lstStyle/>
-          <a:p>
-            <a:r>
-              <a:rPr lang="fr-FR" sz="1300" i="1" dirty="0">
+          <a:lstStyle>
+            <a:lvl1pPr algn="l" defTabSz="914400" rtl="0" eaLnBrk="1" latinLnBrk="0" hangingPunct="1">
+              <a:lnSpc>
+                <a:spcPct val="90000"/>
+              </a:lnSpc>
+              <a:spcBef>
+                <a:spcPct val="0"/>
+              </a:spcBef>
+              <a:buNone/>
+              <a:defRPr sz="4400" kern="1200">
                 <a:solidFill>
-                  <a:srgbClr val="44546A"/>
+                  <a:schemeClr val="tx1"/>
                 </a:solidFill>
-                <a:effectLst/>
-                <a:latin typeface="Calibri" panose="020F0502020204030204" pitchFamily="34" charset="0"/>
-                <a:ea typeface="Calibri" panose="020F0502020204030204" pitchFamily="34" charset="0"/>
-                <a:cs typeface="Times New Roman" panose="02020603050405020304" pitchFamily="18" charset="0"/>
+                <a:latin typeface="+mj-lt"/>
+                <a:ea typeface="+mj-ea"/>
+                <a:cs typeface="+mj-cs"/>
+              </a:defRPr>
+            </a:lvl1pPr>
+          </a:lstStyle>
+          <a:p>
+            <a:r>
+              <a:rPr lang="fr-FR" sz="2300" u="sng" dirty="0">
+                <a:latin typeface="Calibri corps"/>
               </a:rPr>
-              <a:t>Figure 4 </a:t>
-            </a:r>
-            <a:r>
-              <a:rPr lang="fr-FR" sz="1300" i="1" dirty="0">
-                <a:solidFill>
-                  <a:srgbClr val="44546A"/>
-                </a:solidFill>
-                <a:latin typeface="Calibri" panose="020F0502020204030204" pitchFamily="34" charset="0"/>
-                <a:ea typeface="Calibri" panose="020F0502020204030204" pitchFamily="34" charset="0"/>
-                <a:cs typeface="Times New Roman" panose="02020603050405020304" pitchFamily="18" charset="0"/>
-              </a:rPr>
-              <a:t>: Rendu de la data augmentation 1</a:t>
-            </a:r>
-          </a:p>
-        </p:txBody>
-      </p:sp>
-      <p:sp>
-        <p:nvSpPr>
-          <p:cNvPr id="26" name="ZoneTexte 25">
-            <a:extLst>
-              <a:ext uri="{FF2B5EF4-FFF2-40B4-BE49-F238E27FC236}">
-                <a16:creationId xmlns:a16="http://schemas.microsoft.com/office/drawing/2014/main" id="{9A1C965A-F49E-A089-58AF-917784FA0F9F}"/>
-              </a:ext>
-            </a:extLst>
-          </p:cNvPr>
-          <p:cNvSpPr txBox="1"/>
-          <p:nvPr/>
-        </p:nvSpPr>
-        <p:spPr>
-          <a:xfrm>
-            <a:off x="5211417" y="1751199"/>
-            <a:ext cx="6096000" cy="292388"/>
-          </a:xfrm>
-          <a:prstGeom prst="rect">
-            <a:avLst/>
-          </a:prstGeom>
-          <a:noFill/>
-        </p:spPr>
-        <p:txBody>
-          <a:bodyPr wrap="square">
-            <a:spAutoFit/>
-          </a:bodyPr>
-          <a:lstStyle/>
-          <a:p>
-            <a:r>
-              <a:rPr lang="fr-FR" sz="1300" i="1" dirty="0">
-                <a:solidFill>
-                  <a:srgbClr val="44546A"/>
-                </a:solidFill>
-                <a:effectLst/>
-                <a:latin typeface="Calibri" panose="020F0502020204030204" pitchFamily="34" charset="0"/>
-                <a:ea typeface="Calibri" panose="020F0502020204030204" pitchFamily="34" charset="0"/>
-                <a:cs typeface="Times New Roman" panose="02020603050405020304" pitchFamily="18" charset="0"/>
-              </a:rPr>
-              <a:t>Figure 5 </a:t>
-            </a:r>
-            <a:r>
-              <a:rPr lang="fr-FR" sz="1300" i="1" dirty="0">
-                <a:solidFill>
-                  <a:srgbClr val="44546A"/>
-                </a:solidFill>
-                <a:latin typeface="Calibri" panose="020F0502020204030204" pitchFamily="34" charset="0"/>
-                <a:ea typeface="Calibri" panose="020F0502020204030204" pitchFamily="34" charset="0"/>
-                <a:cs typeface="Times New Roman" panose="02020603050405020304" pitchFamily="18" charset="0"/>
-              </a:rPr>
-              <a:t>: Data augmentation 1</a:t>
-            </a:r>
-          </a:p>
-        </p:txBody>
-      </p:sp>
-      <p:sp>
-        <p:nvSpPr>
-          <p:cNvPr id="27" name="ZoneTexte 26">
-            <a:extLst>
-              <a:ext uri="{FF2B5EF4-FFF2-40B4-BE49-F238E27FC236}">
-                <a16:creationId xmlns:a16="http://schemas.microsoft.com/office/drawing/2014/main" id="{848B980F-EF5C-2817-DCB5-B824C496BB99}"/>
-              </a:ext>
-            </a:extLst>
-          </p:cNvPr>
-          <p:cNvSpPr txBox="1"/>
-          <p:nvPr/>
-        </p:nvSpPr>
-        <p:spPr>
-          <a:xfrm>
-            <a:off x="253259" y="4581648"/>
-            <a:ext cx="6096000" cy="292388"/>
-          </a:xfrm>
-          <a:prstGeom prst="rect">
-            <a:avLst/>
-          </a:prstGeom>
-          <a:noFill/>
-        </p:spPr>
-        <p:txBody>
-          <a:bodyPr wrap="square">
-            <a:spAutoFit/>
-          </a:bodyPr>
-          <a:lstStyle/>
-          <a:p>
-            <a:r>
-              <a:rPr lang="fr-FR" sz="1300" i="1" dirty="0">
-                <a:solidFill>
-                  <a:srgbClr val="44546A"/>
-                </a:solidFill>
-                <a:effectLst/>
-                <a:latin typeface="Calibri" panose="020F0502020204030204" pitchFamily="34" charset="0"/>
-                <a:ea typeface="Calibri" panose="020F0502020204030204" pitchFamily="34" charset="0"/>
-                <a:cs typeface="Times New Roman" panose="02020603050405020304" pitchFamily="18" charset="0"/>
-              </a:rPr>
-              <a:t>Figure 8 </a:t>
-            </a:r>
-            <a:r>
-              <a:rPr lang="fr-FR" sz="1300" i="1" dirty="0">
-                <a:solidFill>
-                  <a:srgbClr val="44546A"/>
-                </a:solidFill>
-                <a:latin typeface="Calibri" panose="020F0502020204030204" pitchFamily="34" charset="0"/>
-                <a:ea typeface="Calibri" panose="020F0502020204030204" pitchFamily="34" charset="0"/>
-                <a:cs typeface="Times New Roman" panose="02020603050405020304" pitchFamily="18" charset="0"/>
-              </a:rPr>
-              <a:t>: Résultats avec la data augmentation 1</a:t>
-            </a:r>
-          </a:p>
-        </p:txBody>
-      </p:sp>
-      <p:sp>
-        <p:nvSpPr>
-          <p:cNvPr id="28" name="ZoneTexte 27">
-            <a:extLst>
-              <a:ext uri="{FF2B5EF4-FFF2-40B4-BE49-F238E27FC236}">
-                <a16:creationId xmlns:a16="http://schemas.microsoft.com/office/drawing/2014/main" id="{46E6B8EA-BB49-37F6-D74F-A30734294245}"/>
-              </a:ext>
-            </a:extLst>
-          </p:cNvPr>
-          <p:cNvSpPr txBox="1"/>
-          <p:nvPr/>
-        </p:nvSpPr>
-        <p:spPr>
-          <a:xfrm>
-            <a:off x="7478702" y="4259767"/>
-            <a:ext cx="6096000" cy="292388"/>
-          </a:xfrm>
-          <a:prstGeom prst="rect">
-            <a:avLst/>
-          </a:prstGeom>
-          <a:noFill/>
-        </p:spPr>
-        <p:txBody>
-          <a:bodyPr wrap="square">
-            <a:spAutoFit/>
-          </a:bodyPr>
-          <a:lstStyle/>
-          <a:p>
-            <a:r>
-              <a:rPr lang="fr-FR" sz="1300" i="1" dirty="0">
-                <a:solidFill>
-                  <a:srgbClr val="44546A"/>
-                </a:solidFill>
-                <a:effectLst/>
-                <a:latin typeface="Calibri" panose="020F0502020204030204" pitchFamily="34" charset="0"/>
-                <a:ea typeface="Calibri" panose="020F0502020204030204" pitchFamily="34" charset="0"/>
-                <a:cs typeface="Times New Roman" panose="02020603050405020304" pitchFamily="18" charset="0"/>
-              </a:rPr>
-              <a:t>Figure 6 </a:t>
-            </a:r>
-            <a:r>
-              <a:rPr lang="fr-FR" sz="1300" i="1" dirty="0">
-                <a:solidFill>
-                  <a:srgbClr val="44546A"/>
-                </a:solidFill>
-                <a:latin typeface="Calibri" panose="020F0502020204030204" pitchFamily="34" charset="0"/>
-                <a:ea typeface="Calibri" panose="020F0502020204030204" pitchFamily="34" charset="0"/>
-                <a:cs typeface="Times New Roman" panose="02020603050405020304" pitchFamily="18" charset="0"/>
-              </a:rPr>
-              <a:t>: Data augmentation 2</a:t>
-            </a:r>
-          </a:p>
-        </p:txBody>
-      </p:sp>
-      <p:sp>
-        <p:nvSpPr>
-          <p:cNvPr id="29" name="ZoneTexte 28">
-            <a:extLst>
-              <a:ext uri="{FF2B5EF4-FFF2-40B4-BE49-F238E27FC236}">
-                <a16:creationId xmlns:a16="http://schemas.microsoft.com/office/drawing/2014/main" id="{2F38059C-25D2-6473-65D5-F07FCC4B4F16}"/>
-              </a:ext>
-            </a:extLst>
-          </p:cNvPr>
-          <p:cNvSpPr txBox="1"/>
-          <p:nvPr/>
-        </p:nvSpPr>
-        <p:spPr>
-          <a:xfrm>
-            <a:off x="253259" y="6101693"/>
-            <a:ext cx="6096000" cy="492443"/>
-          </a:xfrm>
-          <a:prstGeom prst="rect">
-            <a:avLst/>
-          </a:prstGeom>
-          <a:noFill/>
-        </p:spPr>
-        <p:txBody>
-          <a:bodyPr wrap="square">
-            <a:spAutoFit/>
-          </a:bodyPr>
-          <a:lstStyle/>
-          <a:p>
-            <a:r>
-              <a:rPr lang="fr-FR" sz="1300" i="1" dirty="0">
-                <a:solidFill>
-                  <a:srgbClr val="44546A"/>
-                </a:solidFill>
-                <a:effectLst/>
-                <a:latin typeface="Calibri" panose="020F0502020204030204" pitchFamily="34" charset="0"/>
-                <a:ea typeface="Calibri" panose="020F0502020204030204" pitchFamily="34" charset="0"/>
-                <a:cs typeface="Times New Roman" panose="02020603050405020304" pitchFamily="18" charset="0"/>
-              </a:rPr>
-              <a:t>Figure 9 </a:t>
-            </a:r>
-            <a:r>
-              <a:rPr lang="fr-FR" sz="1300" i="1" dirty="0">
-                <a:solidFill>
-                  <a:srgbClr val="44546A"/>
-                </a:solidFill>
-                <a:latin typeface="Calibri" panose="020F0502020204030204" pitchFamily="34" charset="0"/>
-                <a:ea typeface="Calibri" panose="020F0502020204030204" pitchFamily="34" charset="0"/>
-                <a:cs typeface="Times New Roman" panose="02020603050405020304" pitchFamily="18" charset="0"/>
-              </a:rPr>
-              <a:t>: Résultats pour la deuxième data augmentation, et avec un réseau de neurones simple non entrainé</a:t>
-            </a:r>
-          </a:p>
-        </p:txBody>
-      </p:sp>
-      <p:sp>
-        <p:nvSpPr>
-          <p:cNvPr id="30" name="ZoneTexte 29">
-            <a:extLst>
-              <a:ext uri="{FF2B5EF4-FFF2-40B4-BE49-F238E27FC236}">
-                <a16:creationId xmlns:a16="http://schemas.microsoft.com/office/drawing/2014/main" id="{D4B89C9D-A2AF-3B69-3269-C3C8B051E0FE}"/>
-              </a:ext>
-            </a:extLst>
-          </p:cNvPr>
-          <p:cNvSpPr txBox="1"/>
-          <p:nvPr/>
-        </p:nvSpPr>
-        <p:spPr>
-          <a:xfrm>
-            <a:off x="7441420" y="6194433"/>
-            <a:ext cx="6096000" cy="292388"/>
-          </a:xfrm>
-          <a:prstGeom prst="rect">
-            <a:avLst/>
-          </a:prstGeom>
-          <a:noFill/>
-        </p:spPr>
-        <p:txBody>
-          <a:bodyPr wrap="square">
-            <a:spAutoFit/>
-          </a:bodyPr>
-          <a:lstStyle/>
-          <a:p>
-            <a:r>
-              <a:rPr lang="fr-FR" sz="1300" i="1" dirty="0">
-                <a:solidFill>
-                  <a:srgbClr val="44546A"/>
-                </a:solidFill>
-                <a:effectLst/>
-                <a:latin typeface="Calibri" panose="020F0502020204030204" pitchFamily="34" charset="0"/>
-                <a:ea typeface="Calibri" panose="020F0502020204030204" pitchFamily="34" charset="0"/>
-                <a:cs typeface="Times New Roman" panose="02020603050405020304" pitchFamily="18" charset="0"/>
-              </a:rPr>
-              <a:t>Figure 7 </a:t>
-            </a:r>
-            <a:r>
-              <a:rPr lang="fr-FR" sz="1300" i="1" dirty="0">
-                <a:solidFill>
-                  <a:srgbClr val="44546A"/>
-                </a:solidFill>
-                <a:latin typeface="Calibri" panose="020F0502020204030204" pitchFamily="34" charset="0"/>
-                <a:ea typeface="Calibri" panose="020F0502020204030204" pitchFamily="34" charset="0"/>
-                <a:cs typeface="Times New Roman" panose="02020603050405020304" pitchFamily="18" charset="0"/>
-              </a:rPr>
-              <a:t>: Réseau de neurones simple non entrainé</a:t>
-            </a:r>
-          </a:p>
-        </p:txBody>
-      </p:sp>
-      <p:sp>
-        <p:nvSpPr>
-          <p:cNvPr id="3" name="Rectangle 2">
-            <a:extLst>
-              <a:ext uri="{FF2B5EF4-FFF2-40B4-BE49-F238E27FC236}">
-                <a16:creationId xmlns:a16="http://schemas.microsoft.com/office/drawing/2014/main" id="{BC518DA6-041B-A203-EA66-9D1DFA3E01F7}"/>
-              </a:ext>
-            </a:extLst>
-          </p:cNvPr>
-          <p:cNvSpPr/>
-          <p:nvPr/>
-        </p:nvSpPr>
-        <p:spPr>
-          <a:xfrm>
-            <a:off x="5081851" y="2745903"/>
-            <a:ext cx="1679629" cy="1816925"/>
-          </a:xfrm>
-          <a:prstGeom prst="rect">
-            <a:avLst/>
-          </a:prstGeom>
-          <a:noFill/>
-          <a:ln w="38100">
-            <a:solidFill>
-              <a:srgbClr val="FF0000"/>
-            </a:solidFill>
-          </a:ln>
-        </p:spPr>
-        <p:style>
-          <a:lnRef idx="2">
-            <a:schemeClr val="dk1"/>
-          </a:lnRef>
-          <a:fillRef idx="1">
-            <a:schemeClr val="lt1"/>
-          </a:fillRef>
-          <a:effectRef idx="0">
-            <a:schemeClr val="dk1"/>
-          </a:effectRef>
-          <a:fontRef idx="minor">
-            <a:schemeClr val="dk1"/>
-          </a:fontRef>
-        </p:style>
-        <p:txBody>
-          <a:bodyPr rtlCol="0" anchor="ctr"/>
-          <a:lstStyle/>
-          <a:p>
-            <a:pPr algn="ctr"/>
-            <a:endParaRPr lang="fr-FR">
-              <a:solidFill>
-                <a:srgbClr val="FF0000"/>
-              </a:solidFill>
-            </a:endParaRPr>
+              <a:t>3.1 Tests</a:t>
+            </a:r>
           </a:p>
         </p:txBody>
       </p:sp>
     </p:spTree>
     <p:extLst>
       <p:ext uri="{BB962C8B-B14F-4D97-AF65-F5344CB8AC3E}">
-        <p14:creationId xmlns:p14="http://schemas.microsoft.com/office/powerpoint/2010/main" val="981057508"/>
+        <p14:creationId xmlns:p14="http://schemas.microsoft.com/office/powerpoint/2010/main" val="517833090"/>
       </p:ext>
     </p:extLst>
   </p:cSld>
@@ -6749,77 +6595,12 @@
           <a:chExt cx="0" cy="0"/>
         </a:xfrm>
       </p:grpSpPr>
-      <p:sp>
-        <p:nvSpPr>
-          <p:cNvPr id="2" name="Titre 1">
-            <a:extLst>
-              <a:ext uri="{FF2B5EF4-FFF2-40B4-BE49-F238E27FC236}">
-                <a16:creationId xmlns:a16="http://schemas.microsoft.com/office/drawing/2014/main" id="{75AC86D3-8FD1-4F47-A319-7D0542E48B2F}"/>
-              </a:ext>
-            </a:extLst>
-          </p:cNvPr>
-          <p:cNvSpPr>
-            <a:spLocks noGrp="1"/>
-          </p:cNvSpPr>
-          <p:nvPr>
-            <p:ph type="title"/>
-          </p:nvPr>
-        </p:nvSpPr>
-        <p:spPr>
-          <a:xfrm>
-            <a:off x="365607" y="387928"/>
-            <a:ext cx="8596668" cy="427305"/>
-          </a:xfrm>
-        </p:spPr>
-        <p:txBody>
-          <a:bodyPr vert="horz" lIns="91440" tIns="45720" rIns="91440" bIns="45720" rtlCol="0">
-            <a:noAutofit/>
-          </a:bodyPr>
-          <a:lstStyle/>
-          <a:p>
-            <a:r>
-              <a:rPr lang="fr-FR" sz="2500" u="sng" dirty="0"/>
-              <a:t>Résultats</a:t>
-            </a:r>
-          </a:p>
-        </p:txBody>
-      </p:sp>
-      <p:sp>
-        <p:nvSpPr>
-          <p:cNvPr id="4" name="Espace réservé du numéro de diapositive 3">
-            <a:extLst>
-              <a:ext uri="{FF2B5EF4-FFF2-40B4-BE49-F238E27FC236}">
-                <a16:creationId xmlns:a16="http://schemas.microsoft.com/office/drawing/2014/main" id="{90618B9A-7E67-CF71-EB1C-3E957EB79618}"/>
-              </a:ext>
-            </a:extLst>
-          </p:cNvPr>
-          <p:cNvSpPr>
-            <a:spLocks noGrp="1"/>
-          </p:cNvSpPr>
-          <p:nvPr>
-            <p:ph type="sldNum" sz="quarter" idx="12"/>
-          </p:nvPr>
-        </p:nvSpPr>
-        <p:spPr/>
-        <p:txBody>
-          <a:bodyPr/>
-          <a:lstStyle/>
-          <a:p>
-            <a:pPr rtl="0"/>
-            <a:fld id="{3A98EE3D-8CD1-4C3F-BD1C-C98C9596463C}" type="slidenum">
-              <a:rPr lang="fr-FR" noProof="0" smtClean="0"/>
-              <a:t>7</a:t>
-            </a:fld>
-            <a:endParaRPr lang="fr-FR" noProof="0" dirty="0"/>
-          </a:p>
-        </p:txBody>
-      </p:sp>
       <p:pic>
         <p:nvPicPr>
-          <p:cNvPr id="5" name="Image 4">
-            <a:extLst>
-              <a:ext uri="{FF2B5EF4-FFF2-40B4-BE49-F238E27FC236}">
-                <a16:creationId xmlns:a16="http://schemas.microsoft.com/office/drawing/2014/main" id="{227157F8-6EB4-7D3B-D72B-E8FDE2B15513}"/>
+          <p:cNvPr id="6" name="Image 5" descr="Une image contenant texte, capture d’écran, Police, ligne">
+            <a:extLst>
+              <a:ext uri="{FF2B5EF4-FFF2-40B4-BE49-F238E27FC236}">
+                <a16:creationId xmlns:a16="http://schemas.microsoft.com/office/drawing/2014/main" id="{E501223C-1869-FADA-DBB2-CF930FCB442C}"/>
               </a:ext>
             </a:extLst>
           </p:cNvPr>
@@ -6836,20 +6617,243 @@
         </p:blipFill>
         <p:spPr>
           <a:xfrm>
-            <a:off x="2579143" y="2609269"/>
-            <a:ext cx="7700714" cy="1091194"/>
+            <a:off x="6103876" y="263864"/>
+            <a:ext cx="5961538" cy="902829"/>
           </a:xfrm>
           <a:prstGeom prst="rect">
             <a:avLst/>
           </a:prstGeom>
         </p:spPr>
       </p:pic>
-      <p:sp>
-        <p:nvSpPr>
-          <p:cNvPr id="6" name="ZoneTexte 5">
-            <a:extLst>
-              <a:ext uri="{FF2B5EF4-FFF2-40B4-BE49-F238E27FC236}">
-                <a16:creationId xmlns:a16="http://schemas.microsoft.com/office/drawing/2014/main" id="{A62FE321-8C1C-52F2-E815-9A0AC5931831}"/>
+      <p:pic>
+        <p:nvPicPr>
+          <p:cNvPr id="7" name="Image 6" descr="Une image contenant texte, capture d’écran, Police&#10;&#10;Description générée automatiquement">
+            <a:extLst>
+              <a:ext uri="{FF2B5EF4-FFF2-40B4-BE49-F238E27FC236}">
+                <a16:creationId xmlns:a16="http://schemas.microsoft.com/office/drawing/2014/main" id="{F01DA147-F83E-CEC0-D964-ABAD539769B0}"/>
+              </a:ext>
+            </a:extLst>
+          </p:cNvPr>
+          <p:cNvPicPr>
+            <a:picLocks noChangeAspect="1"/>
+          </p:cNvPicPr>
+          <p:nvPr/>
+        </p:nvPicPr>
+        <p:blipFill>
+          <a:blip r:embed="rId4">
+            <a:extLst>
+              <a:ext uri="{28A0092B-C50C-407E-A947-70E740481C1C}">
+                <a14:useLocalDpi xmlns:a14="http://schemas.microsoft.com/office/drawing/2010/main" val="0"/>
+              </a:ext>
+            </a:extLst>
+          </a:blip>
+          <a:stretch>
+            <a:fillRect/>
+          </a:stretch>
+        </p:blipFill>
+        <p:spPr>
+          <a:xfrm>
+            <a:off x="7478702" y="2341316"/>
+            <a:ext cx="4463700" cy="1816926"/>
+          </a:xfrm>
+          <a:prstGeom prst="rect">
+            <a:avLst/>
+          </a:prstGeom>
+        </p:spPr>
+      </p:pic>
+      <p:pic>
+        <p:nvPicPr>
+          <p:cNvPr id="11" name="Image 10" descr="Une image contenant texte, capture d’écran, Police&#10;&#10;Description générée automatiquement">
+            <a:extLst>
+              <a:ext uri="{FF2B5EF4-FFF2-40B4-BE49-F238E27FC236}">
+                <a16:creationId xmlns:a16="http://schemas.microsoft.com/office/drawing/2014/main" id="{D05FBF8C-9494-D6AF-C257-13C1D6C207B1}"/>
+              </a:ext>
+            </a:extLst>
+          </p:cNvPr>
+          <p:cNvPicPr>
+            <a:picLocks noChangeAspect="1"/>
+          </p:cNvPicPr>
+          <p:nvPr/>
+        </p:nvPicPr>
+        <p:blipFill>
+          <a:blip r:embed="rId5"/>
+          <a:stretch>
+            <a:fillRect/>
+          </a:stretch>
+        </p:blipFill>
+        <p:spPr>
+          <a:xfrm>
+            <a:off x="7441420" y="5006811"/>
+            <a:ext cx="4408803" cy="1094882"/>
+          </a:xfrm>
+          <a:prstGeom prst="rect">
+            <a:avLst/>
+          </a:prstGeom>
+        </p:spPr>
+      </p:pic>
+      <p:sp>
+        <p:nvSpPr>
+          <p:cNvPr id="2" name="Titre 1">
+            <a:extLst>
+              <a:ext uri="{FF2B5EF4-FFF2-40B4-BE49-F238E27FC236}">
+                <a16:creationId xmlns:a16="http://schemas.microsoft.com/office/drawing/2014/main" id="{CC5DBA0F-9F44-C581-3B33-2DD90FB7EB1F}"/>
+              </a:ext>
+            </a:extLst>
+          </p:cNvPr>
+          <p:cNvSpPr>
+            <a:spLocks noGrp="1"/>
+          </p:cNvSpPr>
+          <p:nvPr>
+            <p:ph type="title"/>
+          </p:nvPr>
+        </p:nvSpPr>
+        <p:spPr>
+          <a:xfrm>
+            <a:off x="126586" y="112043"/>
+            <a:ext cx="3393362" cy="556963"/>
+          </a:xfrm>
+        </p:spPr>
+        <p:txBody>
+          <a:bodyPr vert="horz" lIns="91440" tIns="45720" rIns="91440" bIns="45720" rtlCol="0">
+            <a:noAutofit/>
+          </a:bodyPr>
+          <a:lstStyle/>
+          <a:p>
+            <a:r>
+              <a:rPr lang="fr-FR" sz="2300" u="sng" dirty="0">
+                <a:latin typeface="Calibri corps"/>
+              </a:rPr>
+              <a:t>3.2 Data augmentation</a:t>
+            </a:r>
+          </a:p>
+        </p:txBody>
+      </p:sp>
+      <p:sp>
+        <p:nvSpPr>
+          <p:cNvPr id="13" name="Espace réservé du numéro de diapositive 12">
+            <a:extLst>
+              <a:ext uri="{FF2B5EF4-FFF2-40B4-BE49-F238E27FC236}">
+                <a16:creationId xmlns:a16="http://schemas.microsoft.com/office/drawing/2014/main" id="{409AE5C9-4E3E-5687-7C24-E3FA837B2E14}"/>
+              </a:ext>
+            </a:extLst>
+          </p:cNvPr>
+          <p:cNvSpPr>
+            <a:spLocks noGrp="1"/>
+          </p:cNvSpPr>
+          <p:nvPr>
+            <p:ph type="sldNum" sz="quarter" idx="12"/>
+          </p:nvPr>
+        </p:nvSpPr>
+        <p:spPr/>
+        <p:txBody>
+          <a:bodyPr/>
+          <a:lstStyle/>
+          <a:p>
+            <a:pPr rtl="0"/>
+            <a:fld id="{3A98EE3D-8CD1-4C3F-BD1C-C98C9596463C}" type="slidenum">
+              <a:rPr lang="fr-FR" noProof="0" smtClean="0"/>
+              <a:t>7</a:t>
+            </a:fld>
+            <a:endParaRPr lang="fr-FR" noProof="0" dirty="0"/>
+          </a:p>
+        </p:txBody>
+      </p:sp>
+      <p:pic>
+        <p:nvPicPr>
+          <p:cNvPr id="15" name="Image 14">
+            <a:extLst>
+              <a:ext uri="{FF2B5EF4-FFF2-40B4-BE49-F238E27FC236}">
+                <a16:creationId xmlns:a16="http://schemas.microsoft.com/office/drawing/2014/main" id="{957E62C9-0DA6-72FD-D680-D2DA5675C17D}"/>
+              </a:ext>
+            </a:extLst>
+          </p:cNvPr>
+          <p:cNvPicPr>
+            <a:picLocks noChangeAspect="1"/>
+          </p:cNvPicPr>
+          <p:nvPr/>
+        </p:nvPicPr>
+        <p:blipFill>
+          <a:blip r:embed="rId6"/>
+          <a:stretch>
+            <a:fillRect/>
+          </a:stretch>
+        </p:blipFill>
+        <p:spPr>
+          <a:xfrm>
+            <a:off x="187689" y="2741197"/>
+            <a:ext cx="6925800" cy="1828077"/>
+          </a:xfrm>
+          <a:prstGeom prst="rect">
+            <a:avLst/>
+          </a:prstGeom>
+        </p:spPr>
+      </p:pic>
+      <p:pic>
+        <p:nvPicPr>
+          <p:cNvPr id="21" name="Image 20">
+            <a:extLst>
+              <a:ext uri="{FF2B5EF4-FFF2-40B4-BE49-F238E27FC236}">
+                <a16:creationId xmlns:a16="http://schemas.microsoft.com/office/drawing/2014/main" id="{14741205-BCE9-CE84-7A8A-9677DF8396DA}"/>
+              </a:ext>
+            </a:extLst>
+          </p:cNvPr>
+          <p:cNvPicPr>
+            <a:picLocks noChangeAspect="1"/>
+          </p:cNvPicPr>
+          <p:nvPr/>
+        </p:nvPicPr>
+        <p:blipFill>
+          <a:blip r:embed="rId7"/>
+          <a:stretch>
+            <a:fillRect/>
+          </a:stretch>
+        </p:blipFill>
+        <p:spPr>
+          <a:xfrm>
+            <a:off x="253259" y="5314796"/>
+            <a:ext cx="6925799" cy="722377"/>
+          </a:xfrm>
+          <a:prstGeom prst="rect">
+            <a:avLst/>
+          </a:prstGeom>
+        </p:spPr>
+      </p:pic>
+      <p:pic>
+        <p:nvPicPr>
+          <p:cNvPr id="22" name="Image 21" descr="Une image contenant yeux, gros plan, cil, organe&#10;&#10;Description générée automatiquement">
+            <a:extLst>
+              <a:ext uri="{FF2B5EF4-FFF2-40B4-BE49-F238E27FC236}">
+                <a16:creationId xmlns:a16="http://schemas.microsoft.com/office/drawing/2014/main" id="{B06CFEB8-10D3-257A-1D8C-CDFD6EAB8B9A}"/>
+              </a:ext>
+            </a:extLst>
+          </p:cNvPr>
+          <p:cNvPicPr>
+            <a:picLocks noChangeAspect="1"/>
+          </p:cNvPicPr>
+          <p:nvPr/>
+        </p:nvPicPr>
+        <p:blipFill>
+          <a:blip r:embed="rId8"/>
+          <a:stretch>
+            <a:fillRect/>
+          </a:stretch>
+        </p:blipFill>
+        <p:spPr>
+          <a:xfrm>
+            <a:off x="3592908" y="283411"/>
+            <a:ext cx="2069047" cy="1551785"/>
+          </a:xfrm>
+          <a:prstGeom prst="rect">
+            <a:avLst/>
+          </a:prstGeom>
+        </p:spPr>
+      </p:pic>
+      <p:sp>
+        <p:nvSpPr>
+          <p:cNvPr id="25" name="ZoneTexte 24">
+            <a:extLst>
+              <a:ext uri="{FF2B5EF4-FFF2-40B4-BE49-F238E27FC236}">
+                <a16:creationId xmlns:a16="http://schemas.microsoft.com/office/drawing/2014/main" id="{969CC43B-7A0F-C83B-CC75-CCB999281D08}"/>
               </a:ext>
             </a:extLst>
           </p:cNvPr>
@@ -6858,7 +6862,7 @@
         </p:nvSpPr>
         <p:spPr>
           <a:xfrm>
-            <a:off x="2579143" y="3816060"/>
+            <a:off x="3519948" y="1867512"/>
             <a:ext cx="6096000" cy="292388"/>
           </a:xfrm>
           <a:prstGeom prst="rect">
@@ -6882,7 +6886,7 @@
                 <a:ea typeface="Calibri" panose="020F0502020204030204" pitchFamily="34" charset="0"/>
                 <a:cs typeface="Times New Roman" panose="02020603050405020304" pitchFamily="18" charset="0"/>
               </a:rPr>
-              <a:t>Figure 10 </a:t>
+              <a:t>Figure 4 </a:t>
             </a:r>
             <a:r>
               <a:rPr lang="fr-FR" sz="1300" i="1" dirty="0">
@@ -6893,15 +6897,339 @@
                 <a:ea typeface="Calibri" panose="020F0502020204030204" pitchFamily="34" charset="0"/>
                 <a:cs typeface="Times New Roman" panose="02020603050405020304" pitchFamily="18" charset="0"/>
               </a:rPr>
-              <a:t>: Résultats pour chaque œil</a:t>
-            </a:r>
+              <a:t>: Rendu de la data augmentation 1</a:t>
+            </a:r>
+          </a:p>
+        </p:txBody>
+      </p:sp>
+      <p:sp>
+        <p:nvSpPr>
+          <p:cNvPr id="26" name="ZoneTexte 25">
+            <a:extLst>
+              <a:ext uri="{FF2B5EF4-FFF2-40B4-BE49-F238E27FC236}">
+                <a16:creationId xmlns:a16="http://schemas.microsoft.com/office/drawing/2014/main" id="{9A1C965A-F49E-A089-58AF-917784FA0F9F}"/>
+              </a:ext>
+            </a:extLst>
+          </p:cNvPr>
+          <p:cNvSpPr txBox="1"/>
+          <p:nvPr/>
+        </p:nvSpPr>
+        <p:spPr>
+          <a:xfrm>
+            <a:off x="6036645" y="1238359"/>
+            <a:ext cx="6096000" cy="292388"/>
+          </a:xfrm>
+          <a:prstGeom prst="rect">
+            <a:avLst/>
+          </a:prstGeom>
+          <a:noFill/>
+        </p:spPr>
+        <p:txBody>
+          <a:bodyPr wrap="square">
+            <a:spAutoFit/>
+          </a:bodyPr>
+          <a:lstStyle/>
+          <a:p>
+            <a:r>
+              <a:rPr lang="fr-FR" sz="1300" i="1" dirty="0">
+                <a:solidFill>
+                  <a:srgbClr val="44546A"/>
+                </a:solidFill>
+                <a:effectLst/>
+                <a:latin typeface="Calibri" panose="020F0502020204030204" pitchFamily="34" charset="0"/>
+                <a:ea typeface="Calibri" panose="020F0502020204030204" pitchFamily="34" charset="0"/>
+                <a:cs typeface="Times New Roman" panose="02020603050405020304" pitchFamily="18" charset="0"/>
+              </a:rPr>
+              <a:t>Figure 5 </a:t>
+            </a:r>
+            <a:r>
+              <a:rPr lang="fr-FR" sz="1300" i="1" dirty="0">
+                <a:solidFill>
+                  <a:srgbClr val="44546A"/>
+                </a:solidFill>
+                <a:latin typeface="Calibri" panose="020F0502020204030204" pitchFamily="34" charset="0"/>
+                <a:ea typeface="Calibri" panose="020F0502020204030204" pitchFamily="34" charset="0"/>
+                <a:cs typeface="Times New Roman" panose="02020603050405020304" pitchFamily="18" charset="0"/>
+              </a:rPr>
+              <a:t>: Data augmentation 1</a:t>
+            </a:r>
+          </a:p>
+        </p:txBody>
+      </p:sp>
+      <p:sp>
+        <p:nvSpPr>
+          <p:cNvPr id="27" name="ZoneTexte 26">
+            <a:extLst>
+              <a:ext uri="{FF2B5EF4-FFF2-40B4-BE49-F238E27FC236}">
+                <a16:creationId xmlns:a16="http://schemas.microsoft.com/office/drawing/2014/main" id="{848B980F-EF5C-2817-DCB5-B824C496BB99}"/>
+              </a:ext>
+            </a:extLst>
+          </p:cNvPr>
+          <p:cNvSpPr txBox="1"/>
+          <p:nvPr/>
+        </p:nvSpPr>
+        <p:spPr>
+          <a:xfrm>
+            <a:off x="187689" y="4627348"/>
+            <a:ext cx="6096000" cy="292388"/>
+          </a:xfrm>
+          <a:prstGeom prst="rect">
+            <a:avLst/>
+          </a:prstGeom>
+          <a:noFill/>
+        </p:spPr>
+        <p:txBody>
+          <a:bodyPr wrap="square">
+            <a:spAutoFit/>
+          </a:bodyPr>
+          <a:lstStyle/>
+          <a:p>
+            <a:r>
+              <a:rPr lang="fr-FR" sz="1300" i="1" dirty="0">
+                <a:solidFill>
+                  <a:srgbClr val="44546A"/>
+                </a:solidFill>
+                <a:effectLst/>
+                <a:latin typeface="Calibri" panose="020F0502020204030204" pitchFamily="34" charset="0"/>
+                <a:ea typeface="Calibri" panose="020F0502020204030204" pitchFamily="34" charset="0"/>
+                <a:cs typeface="Times New Roman" panose="02020603050405020304" pitchFamily="18" charset="0"/>
+              </a:rPr>
+              <a:t>Figure 8 </a:t>
+            </a:r>
+            <a:r>
+              <a:rPr lang="fr-FR" sz="1300" i="1" dirty="0">
+                <a:solidFill>
+                  <a:srgbClr val="44546A"/>
+                </a:solidFill>
+                <a:latin typeface="Calibri" panose="020F0502020204030204" pitchFamily="34" charset="0"/>
+                <a:ea typeface="Calibri" panose="020F0502020204030204" pitchFamily="34" charset="0"/>
+                <a:cs typeface="Times New Roman" panose="02020603050405020304" pitchFamily="18" charset="0"/>
+              </a:rPr>
+              <a:t>: Résultats avec la data augmentation 1</a:t>
+            </a:r>
+          </a:p>
+        </p:txBody>
+      </p:sp>
+      <p:sp>
+        <p:nvSpPr>
+          <p:cNvPr id="28" name="ZoneTexte 27">
+            <a:extLst>
+              <a:ext uri="{FF2B5EF4-FFF2-40B4-BE49-F238E27FC236}">
+                <a16:creationId xmlns:a16="http://schemas.microsoft.com/office/drawing/2014/main" id="{46E6B8EA-BB49-37F6-D74F-A30734294245}"/>
+              </a:ext>
+            </a:extLst>
+          </p:cNvPr>
+          <p:cNvSpPr txBox="1"/>
+          <p:nvPr/>
+        </p:nvSpPr>
+        <p:spPr>
+          <a:xfrm>
+            <a:off x="7478702" y="4259767"/>
+            <a:ext cx="6096000" cy="292388"/>
+          </a:xfrm>
+          <a:prstGeom prst="rect">
+            <a:avLst/>
+          </a:prstGeom>
+          <a:noFill/>
+        </p:spPr>
+        <p:txBody>
+          <a:bodyPr wrap="square">
+            <a:spAutoFit/>
+          </a:bodyPr>
+          <a:lstStyle/>
+          <a:p>
+            <a:r>
+              <a:rPr lang="fr-FR" sz="1300" i="1" dirty="0">
+                <a:solidFill>
+                  <a:srgbClr val="44546A"/>
+                </a:solidFill>
+                <a:effectLst/>
+                <a:latin typeface="Calibri" panose="020F0502020204030204" pitchFamily="34" charset="0"/>
+                <a:ea typeface="Calibri" panose="020F0502020204030204" pitchFamily="34" charset="0"/>
+                <a:cs typeface="Times New Roman" panose="02020603050405020304" pitchFamily="18" charset="0"/>
+              </a:rPr>
+              <a:t>Figure 6 </a:t>
+            </a:r>
+            <a:r>
+              <a:rPr lang="fr-FR" sz="1300" i="1" dirty="0">
+                <a:solidFill>
+                  <a:srgbClr val="44546A"/>
+                </a:solidFill>
+                <a:latin typeface="Calibri" panose="020F0502020204030204" pitchFamily="34" charset="0"/>
+                <a:ea typeface="Calibri" panose="020F0502020204030204" pitchFamily="34" charset="0"/>
+                <a:cs typeface="Times New Roman" panose="02020603050405020304" pitchFamily="18" charset="0"/>
+              </a:rPr>
+              <a:t>: Data augmentation 2</a:t>
+            </a:r>
+          </a:p>
+        </p:txBody>
+      </p:sp>
+      <p:sp>
+        <p:nvSpPr>
+          <p:cNvPr id="29" name="ZoneTexte 28">
+            <a:extLst>
+              <a:ext uri="{FF2B5EF4-FFF2-40B4-BE49-F238E27FC236}">
+                <a16:creationId xmlns:a16="http://schemas.microsoft.com/office/drawing/2014/main" id="{2F38059C-25D2-6473-65D5-F07FCC4B4F16}"/>
+              </a:ext>
+            </a:extLst>
+          </p:cNvPr>
+          <p:cNvSpPr txBox="1"/>
+          <p:nvPr/>
+        </p:nvSpPr>
+        <p:spPr>
+          <a:xfrm>
+            <a:off x="253259" y="6101693"/>
+            <a:ext cx="6096000" cy="492443"/>
+          </a:xfrm>
+          <a:prstGeom prst="rect">
+            <a:avLst/>
+          </a:prstGeom>
+          <a:noFill/>
+        </p:spPr>
+        <p:txBody>
+          <a:bodyPr wrap="square">
+            <a:spAutoFit/>
+          </a:bodyPr>
+          <a:lstStyle/>
+          <a:p>
+            <a:r>
+              <a:rPr lang="fr-FR" sz="1300" i="1" dirty="0">
+                <a:solidFill>
+                  <a:srgbClr val="44546A"/>
+                </a:solidFill>
+                <a:effectLst/>
+                <a:latin typeface="Calibri" panose="020F0502020204030204" pitchFamily="34" charset="0"/>
+                <a:ea typeface="Calibri" panose="020F0502020204030204" pitchFamily="34" charset="0"/>
+                <a:cs typeface="Times New Roman" panose="02020603050405020304" pitchFamily="18" charset="0"/>
+              </a:rPr>
+              <a:t>Figure 9 </a:t>
+            </a:r>
+            <a:r>
+              <a:rPr lang="fr-FR" sz="1300" i="1" dirty="0">
+                <a:solidFill>
+                  <a:srgbClr val="44546A"/>
+                </a:solidFill>
+                <a:latin typeface="Calibri" panose="020F0502020204030204" pitchFamily="34" charset="0"/>
+                <a:ea typeface="Calibri" panose="020F0502020204030204" pitchFamily="34" charset="0"/>
+                <a:cs typeface="Times New Roman" panose="02020603050405020304" pitchFamily="18" charset="0"/>
+              </a:rPr>
+              <a:t>: Résultats pour la deuxième data augmentation, et avec un réseau de neurones simple non entrainé</a:t>
+            </a:r>
+          </a:p>
+        </p:txBody>
+      </p:sp>
+      <p:sp>
+        <p:nvSpPr>
+          <p:cNvPr id="30" name="ZoneTexte 29">
+            <a:extLst>
+              <a:ext uri="{FF2B5EF4-FFF2-40B4-BE49-F238E27FC236}">
+                <a16:creationId xmlns:a16="http://schemas.microsoft.com/office/drawing/2014/main" id="{D4B89C9D-A2AF-3B69-3269-C3C8B051E0FE}"/>
+              </a:ext>
+            </a:extLst>
+          </p:cNvPr>
+          <p:cNvSpPr txBox="1"/>
+          <p:nvPr/>
+        </p:nvSpPr>
+        <p:spPr>
+          <a:xfrm>
+            <a:off x="7441420" y="6194433"/>
+            <a:ext cx="6096000" cy="292388"/>
+          </a:xfrm>
+          <a:prstGeom prst="rect">
+            <a:avLst/>
+          </a:prstGeom>
+          <a:noFill/>
+        </p:spPr>
+        <p:txBody>
+          <a:bodyPr wrap="square">
+            <a:spAutoFit/>
+          </a:bodyPr>
+          <a:lstStyle/>
+          <a:p>
+            <a:r>
+              <a:rPr lang="fr-FR" sz="1300" i="1" dirty="0">
+                <a:solidFill>
+                  <a:srgbClr val="44546A"/>
+                </a:solidFill>
+                <a:effectLst/>
+                <a:latin typeface="Calibri" panose="020F0502020204030204" pitchFamily="34" charset="0"/>
+                <a:ea typeface="Calibri" panose="020F0502020204030204" pitchFamily="34" charset="0"/>
+                <a:cs typeface="Times New Roman" panose="02020603050405020304" pitchFamily="18" charset="0"/>
+              </a:rPr>
+              <a:t>Figure 7 </a:t>
+            </a:r>
+            <a:r>
+              <a:rPr lang="fr-FR" sz="1300" i="1" dirty="0">
+                <a:solidFill>
+                  <a:srgbClr val="44546A"/>
+                </a:solidFill>
+                <a:latin typeface="Calibri" panose="020F0502020204030204" pitchFamily="34" charset="0"/>
+                <a:ea typeface="Calibri" panose="020F0502020204030204" pitchFamily="34" charset="0"/>
+                <a:cs typeface="Times New Roman" panose="02020603050405020304" pitchFamily="18" charset="0"/>
+              </a:rPr>
+              <a:t>: Réseau de neurones simple non entrainé</a:t>
+            </a:r>
+          </a:p>
+        </p:txBody>
+      </p:sp>
+      <p:sp>
+        <p:nvSpPr>
+          <p:cNvPr id="3" name="Rectangle 2">
+            <a:extLst>
+              <a:ext uri="{FF2B5EF4-FFF2-40B4-BE49-F238E27FC236}">
+                <a16:creationId xmlns:a16="http://schemas.microsoft.com/office/drawing/2014/main" id="{BC518DA6-041B-A203-EA66-9D1DFA3E01F7}"/>
+              </a:ext>
+            </a:extLst>
+          </p:cNvPr>
+          <p:cNvSpPr/>
+          <p:nvPr/>
+        </p:nvSpPr>
+        <p:spPr>
+          <a:xfrm>
+            <a:off x="5427406" y="2729253"/>
+            <a:ext cx="1751653" cy="1864083"/>
+          </a:xfrm>
+          <a:prstGeom prst="rect">
+            <a:avLst/>
+          </a:prstGeom>
+          <a:noFill/>
+          <a:ln w="38100">
+            <a:solidFill>
+              <a:srgbClr val="FF0000"/>
+            </a:solidFill>
+          </a:ln>
+        </p:spPr>
+        <p:style>
+          <a:lnRef idx="2">
+            <a:schemeClr val="dk1"/>
+          </a:lnRef>
+          <a:fillRef idx="1">
+            <a:schemeClr val="lt1"/>
+          </a:fillRef>
+          <a:effectRef idx="0">
+            <a:schemeClr val="dk1"/>
+          </a:effectRef>
+          <a:fontRef idx="minor">
+            <a:schemeClr val="dk1"/>
+          </a:fontRef>
+        </p:style>
+        <p:txBody>
+          <a:bodyPr rtlCol="0" anchor="ctr"/>
+          <a:lstStyle/>
+          <a:p>
+            <a:pPr algn="ctr"/>
+            <a:endParaRPr lang="fr-FR">
+              <a:solidFill>
+                <a:srgbClr val="FF0000"/>
+              </a:solidFill>
+            </a:endParaRPr>
           </a:p>
         </p:txBody>
       </p:sp>
     </p:spTree>
     <p:extLst>
       <p:ext uri="{BB962C8B-B14F-4D97-AF65-F5344CB8AC3E}">
-        <p14:creationId xmlns:p14="http://schemas.microsoft.com/office/powerpoint/2010/main" val="3262847201"/>
+        <p14:creationId xmlns:p14="http://schemas.microsoft.com/office/powerpoint/2010/main" val="981057508"/>
       </p:ext>
     </p:extLst>
   </p:cSld>
@@ -6946,7 +7274,7 @@
         </p:nvSpPr>
         <p:spPr>
           <a:xfrm>
-            <a:off x="365607" y="387928"/>
+            <a:off x="227956" y="250276"/>
             <a:ext cx="8596668" cy="427305"/>
           </a:xfrm>
         </p:spPr>
@@ -6957,22 +7285,20 @@
           <a:lstStyle/>
           <a:p>
             <a:r>
-              <a:rPr lang="fr-FR" sz="2500" u="sng" dirty="0"/>
-              <a:t>Application</a:t>
-            </a:r>
-            <a:r>
-              <a:rPr lang="fr-FR" sz="2400" dirty="0"/>
-              <a:t> </a:t>
-            </a:r>
-          </a:p>
-        </p:txBody>
-      </p:sp>
-      <p:sp>
-        <p:nvSpPr>
-          <p:cNvPr id="5" name="Espace réservé du numéro de diapositive 4">
-            <a:extLst>
-              <a:ext uri="{FF2B5EF4-FFF2-40B4-BE49-F238E27FC236}">
-                <a16:creationId xmlns:a16="http://schemas.microsoft.com/office/drawing/2014/main" id="{A463E93F-5A2C-B47F-EBC6-0E59855F9AFD}"/>
+              <a:rPr lang="fr-FR" sz="2300" u="sng" dirty="0">
+                <a:latin typeface="Calibri corps"/>
+              </a:rPr>
+              <a:t>3.3 Résultats</a:t>
+            </a:r>
+          </a:p>
+        </p:txBody>
+      </p:sp>
+      <p:sp>
+        <p:nvSpPr>
+          <p:cNvPr id="4" name="Espace réservé du numéro de diapositive 3">
+            <a:extLst>
+              <a:ext uri="{FF2B5EF4-FFF2-40B4-BE49-F238E27FC236}">
+                <a16:creationId xmlns:a16="http://schemas.microsoft.com/office/drawing/2014/main" id="{90618B9A-7E67-CF71-EB1C-3E957EB79618}"/>
               </a:ext>
             </a:extLst>
           </p:cNvPr>
@@ -6992,6 +7318,193 @@
             <a:fld id="{3A98EE3D-8CD1-4C3F-BD1C-C98C9596463C}" type="slidenum">
               <a:rPr lang="fr-FR" noProof="0" smtClean="0"/>
               <a:t>8</a:t>
+            </a:fld>
+            <a:endParaRPr lang="fr-FR" noProof="0" dirty="0"/>
+          </a:p>
+        </p:txBody>
+      </p:sp>
+      <p:pic>
+        <p:nvPicPr>
+          <p:cNvPr id="5" name="Image 4">
+            <a:extLst>
+              <a:ext uri="{FF2B5EF4-FFF2-40B4-BE49-F238E27FC236}">
+                <a16:creationId xmlns:a16="http://schemas.microsoft.com/office/drawing/2014/main" id="{227157F8-6EB4-7D3B-D72B-E8FDE2B15513}"/>
+              </a:ext>
+            </a:extLst>
+          </p:cNvPr>
+          <p:cNvPicPr>
+            <a:picLocks noChangeAspect="1"/>
+          </p:cNvPicPr>
+          <p:nvPr/>
+        </p:nvPicPr>
+        <p:blipFill>
+          <a:blip r:embed="rId3"/>
+          <a:stretch>
+            <a:fillRect/>
+          </a:stretch>
+        </p:blipFill>
+        <p:spPr>
+          <a:xfrm>
+            <a:off x="1386348" y="2199389"/>
+            <a:ext cx="10249965" cy="1452424"/>
+          </a:xfrm>
+          <a:prstGeom prst="rect">
+            <a:avLst/>
+          </a:prstGeom>
+        </p:spPr>
+      </p:pic>
+      <p:sp>
+        <p:nvSpPr>
+          <p:cNvPr id="6" name="ZoneTexte 5">
+            <a:extLst>
+              <a:ext uri="{FF2B5EF4-FFF2-40B4-BE49-F238E27FC236}">
+                <a16:creationId xmlns:a16="http://schemas.microsoft.com/office/drawing/2014/main" id="{A62FE321-8C1C-52F2-E815-9A0AC5931831}"/>
+              </a:ext>
+            </a:extLst>
+          </p:cNvPr>
+          <p:cNvSpPr txBox="1"/>
+          <p:nvPr/>
+        </p:nvSpPr>
+        <p:spPr>
+          <a:xfrm>
+            <a:off x="1478290" y="3884886"/>
+            <a:ext cx="6096000" cy="292388"/>
+          </a:xfrm>
+          <a:prstGeom prst="rect">
+            <a:avLst/>
+          </a:prstGeom>
+          <a:noFill/>
+        </p:spPr>
+        <p:txBody>
+          <a:bodyPr wrap="square">
+            <a:spAutoFit/>
+          </a:bodyPr>
+          <a:lstStyle/>
+          <a:p>
+            <a:r>
+              <a:rPr lang="fr-FR" sz="1300" i="1" dirty="0">
+                <a:solidFill>
+                  <a:srgbClr val="44546A"/>
+                </a:solidFill>
+                <a:effectLst/>
+                <a:latin typeface="Calibri" panose="020F0502020204030204" pitchFamily="34" charset="0"/>
+                <a:ea typeface="Calibri" panose="020F0502020204030204" pitchFamily="34" charset="0"/>
+                <a:cs typeface="Times New Roman" panose="02020603050405020304" pitchFamily="18" charset="0"/>
+              </a:rPr>
+              <a:t>Figure 10 </a:t>
+            </a:r>
+            <a:r>
+              <a:rPr lang="fr-FR" sz="1300" i="1" dirty="0">
+                <a:solidFill>
+                  <a:srgbClr val="44546A"/>
+                </a:solidFill>
+                <a:latin typeface="Calibri" panose="020F0502020204030204" pitchFamily="34" charset="0"/>
+                <a:ea typeface="Calibri" panose="020F0502020204030204" pitchFamily="34" charset="0"/>
+                <a:cs typeface="Times New Roman" panose="02020603050405020304" pitchFamily="18" charset="0"/>
+              </a:rPr>
+              <a:t>: Résultats pour chaque œil</a:t>
+            </a:r>
+          </a:p>
+        </p:txBody>
+      </p:sp>
+    </p:spTree>
+    <p:extLst>
+      <p:ext uri="{BB962C8B-B14F-4D97-AF65-F5344CB8AC3E}">
+        <p14:creationId xmlns:p14="http://schemas.microsoft.com/office/powerpoint/2010/main" val="3262847201"/>
+      </p:ext>
+    </p:extLst>
+  </p:cSld>
+  <p:clrMapOvr>
+    <a:masterClrMapping/>
+  </p:clrMapOvr>
+</p:sld>
+</file>
+
+<file path=ppt/slides/slide9.xml><?xml version="1.0" encoding="utf-8"?>
+<p:sld xmlns:a="http://schemas.openxmlformats.org/drawingml/2006/main" xmlns:r="http://schemas.openxmlformats.org/officeDocument/2006/relationships" xmlns:p="http://schemas.openxmlformats.org/presentationml/2006/main">
+  <p:cSld>
+    <p:spTree>
+      <p:nvGrpSpPr>
+        <p:cNvPr id="1" name=""/>
+        <p:cNvGrpSpPr/>
+        <p:nvPr/>
+      </p:nvGrpSpPr>
+      <p:grpSpPr>
+        <a:xfrm>
+          <a:off x="0" y="0"/>
+          <a:ext cx="0" cy="0"/>
+          <a:chOff x="0" y="0"/>
+          <a:chExt cx="0" cy="0"/>
+        </a:xfrm>
+      </p:grpSpPr>
+      <p:sp>
+        <p:nvSpPr>
+          <p:cNvPr id="2" name="Titre 1">
+            <a:extLst>
+              <a:ext uri="{FF2B5EF4-FFF2-40B4-BE49-F238E27FC236}">
+                <a16:creationId xmlns:a16="http://schemas.microsoft.com/office/drawing/2014/main" id="{75AC86D3-8FD1-4F47-A319-7D0542E48B2F}"/>
+              </a:ext>
+            </a:extLst>
+          </p:cNvPr>
+          <p:cNvSpPr>
+            <a:spLocks noGrp="1"/>
+          </p:cNvSpPr>
+          <p:nvPr>
+            <p:ph type="title"/>
+          </p:nvPr>
+        </p:nvSpPr>
+        <p:spPr>
+          <a:xfrm>
+            <a:off x="267285" y="284912"/>
+            <a:ext cx="8596668" cy="427305"/>
+          </a:xfrm>
+        </p:spPr>
+        <p:txBody>
+          <a:bodyPr vert="horz" lIns="91440" tIns="45720" rIns="91440" bIns="45720" rtlCol="0">
+            <a:noAutofit/>
+          </a:bodyPr>
+          <a:lstStyle/>
+          <a:p>
+            <a:r>
+              <a:rPr lang="fr-FR" sz="2800" u="sng" dirty="0">
+                <a:latin typeface="Calibri corps"/>
+              </a:rPr>
+              <a:t>4. Présentation de l’application</a:t>
+            </a:r>
+            <a:r>
+              <a:rPr lang="fr-FR" sz="2400" u="sng" dirty="0">
+                <a:latin typeface="Calibri corps"/>
+              </a:rPr>
+              <a:t> </a:t>
+            </a:r>
+          </a:p>
+        </p:txBody>
+      </p:sp>
+      <p:sp>
+        <p:nvSpPr>
+          <p:cNvPr id="5" name="Espace réservé du numéro de diapositive 4">
+            <a:extLst>
+              <a:ext uri="{FF2B5EF4-FFF2-40B4-BE49-F238E27FC236}">
+                <a16:creationId xmlns:a16="http://schemas.microsoft.com/office/drawing/2014/main" id="{A463E93F-5A2C-B47F-EBC6-0E59855F9AFD}"/>
+              </a:ext>
+            </a:extLst>
+          </p:cNvPr>
+          <p:cNvSpPr>
+            <a:spLocks noGrp="1"/>
+          </p:cNvSpPr>
+          <p:nvPr>
+            <p:ph type="sldNum" sz="quarter" idx="12"/>
+          </p:nvPr>
+        </p:nvSpPr>
+        <p:spPr/>
+        <p:txBody>
+          <a:bodyPr/>
+          <a:lstStyle/>
+          <a:p>
+            <a:pPr rtl="0"/>
+            <a:fld id="{3A98EE3D-8CD1-4C3F-BD1C-C98C9596463C}" type="slidenum">
+              <a:rPr lang="fr-FR" noProof="0" smtClean="0"/>
+              <a:t>9</a:t>
             </a:fld>
             <a:endParaRPr lang="fr-FR" noProof="0" dirty="0"/>
           </a:p>
@@ -7092,165 +7605,6 @@
     <p:extLst>
       <p:ext uri="{BB962C8B-B14F-4D97-AF65-F5344CB8AC3E}">
         <p14:creationId xmlns:p14="http://schemas.microsoft.com/office/powerpoint/2010/main" val="2149124246"/>
-      </p:ext>
-    </p:extLst>
-  </p:cSld>
-  <p:clrMapOvr>
-    <a:masterClrMapping/>
-  </p:clrMapOvr>
-</p:sld>
-</file>
-
-<file path=ppt/slides/slide9.xml><?xml version="1.0" encoding="utf-8"?>
-<p:sld xmlns:a="http://schemas.openxmlformats.org/drawingml/2006/main" xmlns:r="http://schemas.openxmlformats.org/officeDocument/2006/relationships" xmlns:p="http://schemas.openxmlformats.org/presentationml/2006/main">
-  <p:cSld>
-    <p:spTree>
-      <p:nvGrpSpPr>
-        <p:cNvPr id="1" name=""/>
-        <p:cNvGrpSpPr/>
-        <p:nvPr/>
-      </p:nvGrpSpPr>
-      <p:grpSpPr>
-        <a:xfrm>
-          <a:off x="0" y="0"/>
-          <a:ext cx="0" cy="0"/>
-          <a:chOff x="0" y="0"/>
-          <a:chExt cx="0" cy="0"/>
-        </a:xfrm>
-      </p:grpSpPr>
-      <p:sp>
-        <p:nvSpPr>
-          <p:cNvPr id="2" name="Titre 1">
-            <a:extLst>
-              <a:ext uri="{FF2B5EF4-FFF2-40B4-BE49-F238E27FC236}">
-                <a16:creationId xmlns:a16="http://schemas.microsoft.com/office/drawing/2014/main" id="{75AC86D3-8FD1-4F47-A319-7D0542E48B2F}"/>
-              </a:ext>
-            </a:extLst>
-          </p:cNvPr>
-          <p:cNvSpPr>
-            <a:spLocks noGrp="1"/>
-          </p:cNvSpPr>
-          <p:nvPr>
-            <p:ph type="title"/>
-          </p:nvPr>
-        </p:nvSpPr>
-        <p:spPr>
-          <a:xfrm>
-            <a:off x="365607" y="387928"/>
-            <a:ext cx="8596668" cy="427305"/>
-          </a:xfrm>
-        </p:spPr>
-        <p:txBody>
-          <a:bodyPr vert="horz" lIns="91440" tIns="45720" rIns="91440" bIns="45720" rtlCol="0">
-            <a:noAutofit/>
-          </a:bodyPr>
-          <a:lstStyle/>
-          <a:p>
-            <a:r>
-              <a:rPr lang="fr-FR" sz="2500" u="sng" dirty="0"/>
-              <a:t>Conclusion</a:t>
-            </a:r>
-          </a:p>
-        </p:txBody>
-      </p:sp>
-      <p:sp>
-        <p:nvSpPr>
-          <p:cNvPr id="4" name="Espace réservé du numéro de diapositive 3">
-            <a:extLst>
-              <a:ext uri="{FF2B5EF4-FFF2-40B4-BE49-F238E27FC236}">
-                <a16:creationId xmlns:a16="http://schemas.microsoft.com/office/drawing/2014/main" id="{90618B9A-7E67-CF71-EB1C-3E957EB79618}"/>
-              </a:ext>
-            </a:extLst>
-          </p:cNvPr>
-          <p:cNvSpPr>
-            <a:spLocks noGrp="1"/>
-          </p:cNvSpPr>
-          <p:nvPr>
-            <p:ph type="sldNum" sz="quarter" idx="12"/>
-          </p:nvPr>
-        </p:nvSpPr>
-        <p:spPr/>
-        <p:txBody>
-          <a:bodyPr/>
-          <a:lstStyle/>
-          <a:p>
-            <a:pPr rtl="0"/>
-            <a:fld id="{3A98EE3D-8CD1-4C3F-BD1C-C98C9596463C}" type="slidenum">
-              <a:rPr lang="fr-FR" noProof="0" smtClean="0"/>
-              <a:t>9</a:t>
-            </a:fld>
-            <a:endParaRPr lang="fr-FR" noProof="0" dirty="0"/>
-          </a:p>
-        </p:txBody>
-      </p:sp>
-      <p:sp>
-        <p:nvSpPr>
-          <p:cNvPr id="6" name="ZoneTexte 5">
-            <a:extLst>
-              <a:ext uri="{FF2B5EF4-FFF2-40B4-BE49-F238E27FC236}">
-                <a16:creationId xmlns:a16="http://schemas.microsoft.com/office/drawing/2014/main" id="{64813D20-4B87-1BE0-5C96-5F8DFBDFBB8A}"/>
-              </a:ext>
-            </a:extLst>
-          </p:cNvPr>
-          <p:cNvSpPr txBox="1"/>
-          <p:nvPr/>
-        </p:nvSpPr>
-        <p:spPr>
-          <a:xfrm>
-            <a:off x="225275" y="1065933"/>
-            <a:ext cx="11354360" cy="2846933"/>
-          </a:xfrm>
-          <a:prstGeom prst="rect">
-            <a:avLst/>
-          </a:prstGeom>
-          <a:noFill/>
-        </p:spPr>
-        <p:txBody>
-          <a:bodyPr wrap="square" rtlCol="0">
-            <a:spAutoFit/>
-          </a:bodyPr>
-          <a:lstStyle/>
-          <a:p>
-            <a:r>
-              <a:rPr lang="fr-FR" sz="2300" dirty="0"/>
-              <a:t>Nous avons amélioré le modèle d’IA, de 0,73 de </a:t>
-            </a:r>
-            <a:r>
-              <a:rPr lang="fr-FR" sz="2300" dirty="0" err="1"/>
-              <a:t>val_accuracy</a:t>
-            </a:r>
-            <a:r>
-              <a:rPr lang="fr-FR" sz="2300" dirty="0"/>
-              <a:t> pour le modèle de départ, à 0,96.</a:t>
-            </a:r>
-          </a:p>
-          <a:p>
-            <a:endParaRPr lang="fr-FR" sz="2300" dirty="0"/>
-          </a:p>
-          <a:p>
-            <a:r>
-              <a:rPr lang="fr-FR" sz="2300" dirty="0"/>
-              <a:t>Ajout d’une data augmentation, ainsi qu’une couche de 300 neurones.</a:t>
-            </a:r>
-          </a:p>
-          <a:p>
-            <a:endParaRPr lang="fr-FR" sz="2300" dirty="0"/>
-          </a:p>
-          <a:p>
-            <a:r>
-              <a:rPr lang="fr-FR" sz="2300" dirty="0"/>
-              <a:t>L’application est également devenue fonctionnelle, en affichant les caractéristiques de l’employé dont l’œil est analysé.</a:t>
-            </a:r>
-          </a:p>
-          <a:p>
-            <a:endParaRPr lang="fr-FR" dirty="0"/>
-          </a:p>
-        </p:txBody>
-      </p:sp>
-    </p:spTree>
-    <p:extLst>
-      <p:ext uri="{BB962C8B-B14F-4D97-AF65-F5344CB8AC3E}">
-        <p14:creationId xmlns:p14="http://schemas.microsoft.com/office/powerpoint/2010/main" val="2951193119"/>
       </p:ext>
     </p:extLst>
   </p:cSld>
@@ -8078,15 +8432,6 @@
 </file>
 
 <file path=customXml/item1.xml><?xml version="1.0" encoding="utf-8"?>
-<?mso-contentType ?>
-<FormTemplates xmlns="http://schemas.microsoft.com/sharepoint/v3/contenttype/forms">
-  <Display>DocumentLibraryForm</Display>
-  <Edit>DocumentLibraryForm</Edit>
-  <New>DocumentLibraryForm</New>
-</FormTemplates>
-</file>
-
-<file path=customXml/item2.xml><?xml version="1.0" encoding="utf-8"?>
 <ct:contentTypeSchema xmlns:ct="http://schemas.microsoft.com/office/2006/metadata/contentType" xmlns:ma="http://schemas.microsoft.com/office/2006/metadata/properties/metaAttributes" ct:_="" ma:_="" ma:contentTypeName="Document" ma:contentTypeID="0x01010079F111ED35F8CC479449609E8A0923A6" ma:contentTypeVersion="12" ma:contentTypeDescription="Create a new document." ma:contentTypeScope="" ma:versionID="a410dd7f93c95333ffa1b60ed6adedd1">
   <xsd:schema xmlns:xsd="http://www.w3.org/2001/XMLSchema" xmlns:xs="http://www.w3.org/2001/XMLSchema" xmlns:p="http://schemas.microsoft.com/office/2006/metadata/properties" xmlns:ns2="71af3243-3dd4-4a8d-8c0d-dd76da1f02a5" xmlns:ns3="16c05727-aa75-4e4a-9b5f-8a80a1165891" targetNamespace="http://schemas.microsoft.com/office/2006/metadata/properties" ma:root="true" ma:fieldsID="a936d9baba76aa3866493feff160faab" ns2:_="" ns3:_="">
     <xsd:import namespace="71af3243-3dd4-4a8d-8c0d-dd76da1f02a5"/>
@@ -8307,6 +8652,15 @@
 </ct:contentTypeSchema>
 </file>
 
+<file path=customXml/item2.xml><?xml version="1.0" encoding="utf-8"?>
+<?mso-contentType ?>
+<FormTemplates xmlns="http://schemas.microsoft.com/sharepoint/v3/contenttype/forms">
+  <Display>DocumentLibraryForm</Display>
+  <Edit>DocumentLibraryForm</Edit>
+  <New>DocumentLibraryForm</New>
+</FormTemplates>
+</file>
+
 <file path=customXml/item3.xml><?xml version="1.0" encoding="utf-8"?>
 <p:properties xmlns:p="http://schemas.microsoft.com/office/2006/metadata/properties" xmlns:xsi="http://www.w3.org/2001/XMLSchema-instance" xmlns:pc="http://schemas.microsoft.com/office/infopath/2007/PartnerControls">
   <documentManagement>
@@ -8317,14 +8671,6 @@
 </file>
 
 <file path=customXml/itemProps1.xml><?xml version="1.0" encoding="utf-8"?>
-<ds:datastoreItem xmlns:ds="http://schemas.openxmlformats.org/officeDocument/2006/customXml" ds:itemID="{AA3F7EDC-E5B4-4BBC-9D2A-CBE6D46C37AD}">
-  <ds:schemaRefs>
-    <ds:schemaRef ds:uri="http://schemas.microsoft.com/sharepoint/v3/contenttype/forms"/>
-  </ds:schemaRefs>
-</ds:datastoreItem>
-</file>
-
-<file path=customXml/itemProps2.xml><?xml version="1.0" encoding="utf-8"?>
 <ds:datastoreItem xmlns:ds="http://schemas.openxmlformats.org/officeDocument/2006/customXml" ds:itemID="{93932EF5-314F-409E-8020-FEE5FA0795B9}">
   <ds:schemaRefs>
     <ds:schemaRef ds:uri="http://schemas.microsoft.com/office/2006/metadata/contentType"/>
@@ -8343,6 +8689,14 @@
 </ds:datastoreItem>
 </file>
 
+<file path=customXml/itemProps2.xml><?xml version="1.0" encoding="utf-8"?>
+<ds:datastoreItem xmlns:ds="http://schemas.openxmlformats.org/officeDocument/2006/customXml" ds:itemID="{AA3F7EDC-E5B4-4BBC-9D2A-CBE6D46C37AD}">
+  <ds:schemaRefs>
+    <ds:schemaRef ds:uri="http://schemas.microsoft.com/sharepoint/v3/contenttype/forms"/>
+  </ds:schemaRefs>
+</ds:datastoreItem>
+</file>
+
 <file path=customXml/itemProps3.xml><?xml version="1.0" encoding="utf-8"?>
 <ds:datastoreItem xmlns:ds="http://schemas.openxmlformats.org/officeDocument/2006/customXml" ds:itemID="{A03EEFF0-FB57-4CB4-8BFC-DF397689E2ED}">
   <ds:schemaRefs>

</xml_diff>